<commit_message>
Adição de comentário - VFinal
Adição de comentário - VFinal
</commit_message>
<xml_diff>
--- a/WebSocket_Sis.Academico.pptx
+++ b/WebSocket_Sis.Academico.pptx
@@ -7,7 +7,14 @@
   <p:sldIdLst>
     <p:sldId id="256" r:id="rId2"/>
     <p:sldId id="257" r:id="rId3"/>
-    <p:sldId id="258" r:id="rId4"/>
+    <p:sldId id="263" r:id="rId4"/>
+    <p:sldId id="261" r:id="rId5"/>
+    <p:sldId id="259" r:id="rId6"/>
+    <p:sldId id="262" r:id="rId7"/>
+    <p:sldId id="258" r:id="rId8"/>
+    <p:sldId id="260" r:id="rId9"/>
+    <p:sldId id="264" r:id="rId10"/>
+    <p:sldId id="265" r:id="rId11"/>
   </p:sldIdLst>
   <p:sldSz cx="9144000" cy="6858000" type="screen4x3"/>
   <p:notesSz cx="6858000" cy="9144000"/>
@@ -106,7 +113,530 @@
       </a:defRPr>
     </a:lvl9pPr>
   </p:defaultTextStyle>
+  <p:extLst>
+    <p:ext uri="{EFAFB233-063F-42B5-8137-9DF3F51BA10A}">
+      <p15:sldGuideLst xmlns:p15="http://schemas.microsoft.com/office/powerpoint/2012/main">
+        <p15:guide id="1" orient="horz" pos="2160">
+          <p15:clr>
+            <a:srgbClr val="A4A3A4"/>
+          </p15:clr>
+        </p15:guide>
+        <p15:guide id="2" pos="2880">
+          <p15:clr>
+            <a:srgbClr val="A4A3A4"/>
+          </p15:clr>
+        </p15:guide>
+      </p15:sldGuideLst>
+    </p:ext>
+  </p:extLst>
 </p:presentation>
+</file>
+
+<file path=ppt/revisionInfo.xml><?xml version="1.0" encoding="utf-8"?>
+<p1510:revInfo xmlns:a="http://schemas.openxmlformats.org/drawingml/2006/main" xmlns:r="http://schemas.openxmlformats.org/officeDocument/2006/relationships" xmlns:p1510="http://schemas.microsoft.com/office/powerpoint/2015/10/main">
+  <p1510:revLst>
+    <p1510:client id="{5CB6677E-6AAC-47AE-9EA1-4178BEC8ACDB}" v="24" dt="2023-12-27T00:21:27.143"/>
+  </p1510:revLst>
+</p1510:revInfo>
+</file>
+
+<file path=ppt/changesInfos/changesInfo1.xml><?xml version="1.0" encoding="utf-8"?>
+<pc:chgInfo xmlns:a="http://schemas.openxmlformats.org/drawingml/2006/main" xmlns:r="http://schemas.openxmlformats.org/officeDocument/2006/relationships" xmlns:ac="http://schemas.microsoft.com/office/drawing/2013/main/command" xmlns:pc="http://schemas.microsoft.com/office/powerpoint/2013/main/command">
+  <pc:docChgLst>
+    <pc:chgData name="Amadeus Galvão" userId="90256b45929bb397" providerId="LiveId" clId="{5CB6677E-6AAC-47AE-9EA1-4178BEC8ACDB}"/>
+    <pc:docChg chg="undo custSel addSld delSld modSld sldOrd">
+      <pc:chgData name="Amadeus Galvão" userId="90256b45929bb397" providerId="LiveId" clId="{5CB6677E-6AAC-47AE-9EA1-4178BEC8ACDB}" dt="2023-12-27T00:21:31.154" v="255" actId="1076"/>
+      <pc:docMkLst>
+        <pc:docMk/>
+      </pc:docMkLst>
+      <pc:sldChg chg="modSp mod">
+        <pc:chgData name="Amadeus Galvão" userId="90256b45929bb397" providerId="LiveId" clId="{5CB6677E-6AAC-47AE-9EA1-4178BEC8ACDB}" dt="2023-12-27T00:08:33.530" v="221" actId="20577"/>
+        <pc:sldMkLst>
+          <pc:docMk/>
+          <pc:sldMk cId="0" sldId="256"/>
+        </pc:sldMkLst>
+        <pc:spChg chg="mod">
+          <ac:chgData name="Amadeus Galvão" userId="90256b45929bb397" providerId="LiveId" clId="{5CB6677E-6AAC-47AE-9EA1-4178BEC8ACDB}" dt="2023-12-27T00:08:33.530" v="221" actId="20577"/>
+          <ac:spMkLst>
+            <pc:docMk/>
+            <pc:sldMk cId="0" sldId="256"/>
+            <ac:spMk id="4" creationId="{00000000-0000-0000-0000-000000000000}"/>
+          </ac:spMkLst>
+        </pc:spChg>
+      </pc:sldChg>
+      <pc:sldChg chg="addSp delSp modSp mod ord">
+        <pc:chgData name="Amadeus Galvão" userId="90256b45929bb397" providerId="LiveId" clId="{5CB6677E-6AAC-47AE-9EA1-4178BEC8ACDB}" dt="2023-12-27T00:02:13.254" v="204"/>
+        <pc:sldMkLst>
+          <pc:docMk/>
+          <pc:sldMk cId="0" sldId="257"/>
+        </pc:sldMkLst>
+        <pc:picChg chg="add mod">
+          <ac:chgData name="Amadeus Galvão" userId="90256b45929bb397" providerId="LiveId" clId="{5CB6677E-6AAC-47AE-9EA1-4178BEC8ACDB}" dt="2023-12-23T12:33:21.417" v="55" actId="1076"/>
+          <ac:picMkLst>
+            <pc:docMk/>
+            <pc:sldMk cId="0" sldId="257"/>
+            <ac:picMk id="3" creationId="{CC0F4E9E-1C5E-B570-A7B9-8661E4A0CA93}"/>
+          </ac:picMkLst>
+        </pc:picChg>
+        <pc:picChg chg="del">
+          <ac:chgData name="Amadeus Galvão" userId="90256b45929bb397" providerId="LiveId" clId="{5CB6677E-6AAC-47AE-9EA1-4178BEC8ACDB}" dt="2023-12-23T12:33:11.009" v="49" actId="478"/>
+          <ac:picMkLst>
+            <pc:docMk/>
+            <pc:sldMk cId="0" sldId="257"/>
+            <ac:picMk id="1026" creationId="{00000000-0000-0000-0000-000000000000}"/>
+          </ac:picMkLst>
+        </pc:picChg>
+      </pc:sldChg>
+      <pc:sldChg chg="addSp delSp modSp mod">
+        <pc:chgData name="Amadeus Galvão" userId="90256b45929bb397" providerId="LiveId" clId="{5CB6677E-6AAC-47AE-9EA1-4178BEC8ACDB}" dt="2023-12-23T12:34:07.155" v="63" actId="1076"/>
+        <pc:sldMkLst>
+          <pc:docMk/>
+          <pc:sldMk cId="0" sldId="258"/>
+        </pc:sldMkLst>
+        <pc:picChg chg="add mod">
+          <ac:chgData name="Amadeus Galvão" userId="90256b45929bb397" providerId="LiveId" clId="{5CB6677E-6AAC-47AE-9EA1-4178BEC8ACDB}" dt="2023-12-23T12:34:07.155" v="63" actId="1076"/>
+          <ac:picMkLst>
+            <pc:docMk/>
+            <pc:sldMk cId="0" sldId="258"/>
+            <ac:picMk id="3" creationId="{B6B29EE3-EB30-B25C-3D1C-75C0A12698A9}"/>
+          </ac:picMkLst>
+        </pc:picChg>
+        <pc:picChg chg="del">
+          <ac:chgData name="Amadeus Galvão" userId="90256b45929bb397" providerId="LiveId" clId="{5CB6677E-6AAC-47AE-9EA1-4178BEC8ACDB}" dt="2023-12-23T12:33:57.253" v="57" actId="478"/>
+          <ac:picMkLst>
+            <pc:docMk/>
+            <pc:sldMk cId="0" sldId="258"/>
+            <ac:picMk id="2050" creationId="{00000000-0000-0000-0000-000000000000}"/>
+          </ac:picMkLst>
+        </pc:picChg>
+        <pc:picChg chg="del">
+          <ac:chgData name="Amadeus Galvão" userId="90256b45929bb397" providerId="LiveId" clId="{5CB6677E-6AAC-47AE-9EA1-4178BEC8ACDB}" dt="2023-12-23T12:33:55.715" v="56" actId="478"/>
+          <ac:picMkLst>
+            <pc:docMk/>
+            <pc:sldMk cId="0" sldId="258"/>
+            <ac:picMk id="2051" creationId="{00000000-0000-0000-0000-000000000000}"/>
+          </ac:picMkLst>
+        </pc:picChg>
+      </pc:sldChg>
+      <pc:sldChg chg="addSp delSp modSp add mod ord setBg">
+        <pc:chgData name="Amadeus Galvão" userId="90256b45929bb397" providerId="LiveId" clId="{5CB6677E-6AAC-47AE-9EA1-4178BEC8ACDB}" dt="2023-12-27T00:04:57.287" v="208"/>
+        <pc:sldMkLst>
+          <pc:docMk/>
+          <pc:sldMk cId="3003328585" sldId="259"/>
+        </pc:sldMkLst>
+        <pc:spChg chg="add del">
+          <ac:chgData name="Amadeus Galvão" userId="90256b45929bb397" providerId="LiveId" clId="{5CB6677E-6AAC-47AE-9EA1-4178BEC8ACDB}" dt="2023-12-23T12:13:41.454" v="4" actId="22"/>
+          <ac:spMkLst>
+            <pc:docMk/>
+            <pc:sldMk cId="3003328585" sldId="259"/>
+            <ac:spMk id="3" creationId="{26482C65-50BB-15B3-9BA7-1FFFD8E16FCD}"/>
+          </ac:spMkLst>
+        </pc:spChg>
+        <pc:spChg chg="mod">
+          <ac:chgData name="Amadeus Galvão" userId="90256b45929bb397" providerId="LiveId" clId="{5CB6677E-6AAC-47AE-9EA1-4178BEC8ACDB}" dt="2023-12-26T23:20:59.248" v="129" actId="26606"/>
+          <ac:spMkLst>
+            <pc:docMk/>
+            <pc:sldMk cId="3003328585" sldId="259"/>
+            <ac:spMk id="4" creationId="{00000000-0000-0000-0000-000000000000}"/>
+          </ac:spMkLst>
+        </pc:spChg>
+        <pc:spChg chg="add del">
+          <ac:chgData name="Amadeus Galvão" userId="90256b45929bb397" providerId="LiveId" clId="{5CB6677E-6AAC-47AE-9EA1-4178BEC8ACDB}" dt="2023-12-26T23:20:43.784" v="125" actId="26606"/>
+          <ac:spMkLst>
+            <pc:docMk/>
+            <pc:sldMk cId="3003328585" sldId="259"/>
+            <ac:spMk id="21" creationId="{A4AC5506-6312-4701-8D3C-40187889A947}"/>
+          </ac:spMkLst>
+        </pc:spChg>
+        <pc:spChg chg="add del">
+          <ac:chgData name="Amadeus Galvão" userId="90256b45929bb397" providerId="LiveId" clId="{5CB6677E-6AAC-47AE-9EA1-4178BEC8ACDB}" dt="2023-12-26T23:20:59.248" v="129" actId="26606"/>
+          <ac:spMkLst>
+            <pc:docMk/>
+            <pc:sldMk cId="3003328585" sldId="259"/>
+            <ac:spMk id="28" creationId="{870A1295-61BC-4214-AA3E-D396673024D0}"/>
+          </ac:spMkLst>
+        </pc:spChg>
+        <pc:grpChg chg="add del">
+          <ac:chgData name="Amadeus Galvão" userId="90256b45929bb397" providerId="LiveId" clId="{5CB6677E-6AAC-47AE-9EA1-4178BEC8ACDB}" dt="2023-12-26T23:20:59.248" v="129" actId="26606"/>
+          <ac:grpSpMkLst>
+            <pc:docMk/>
+            <pc:sldMk cId="3003328585" sldId="259"/>
+            <ac:grpSpMk id="23" creationId="{0B139475-2B26-4CA9-9413-DE741E49F7BB}"/>
+          </ac:grpSpMkLst>
+        </pc:grpChg>
+        <pc:picChg chg="add del mod">
+          <ac:chgData name="Amadeus Galvão" userId="90256b45929bb397" providerId="LiveId" clId="{5CB6677E-6AAC-47AE-9EA1-4178BEC8ACDB}" dt="2023-12-23T12:28:07.841" v="13" actId="478"/>
+          <ac:picMkLst>
+            <pc:docMk/>
+            <pc:sldMk cId="3003328585" sldId="259"/>
+            <ac:picMk id="6" creationId="{AF989B04-B7D4-6A97-2F07-CBAB2A8EB164}"/>
+          </ac:picMkLst>
+        </pc:picChg>
+        <pc:picChg chg="add del mod">
+          <ac:chgData name="Amadeus Galvão" userId="90256b45929bb397" providerId="LiveId" clId="{5CB6677E-6AAC-47AE-9EA1-4178BEC8ACDB}" dt="2023-12-23T12:29:48.740" v="29" actId="478"/>
+          <ac:picMkLst>
+            <pc:docMk/>
+            <pc:sldMk cId="3003328585" sldId="259"/>
+            <ac:picMk id="8" creationId="{F281EE9A-381D-1A71-F80F-A22666C5B633}"/>
+          </ac:picMkLst>
+        </pc:picChg>
+        <pc:picChg chg="add del mod">
+          <ac:chgData name="Amadeus Galvão" userId="90256b45929bb397" providerId="LiveId" clId="{5CB6677E-6AAC-47AE-9EA1-4178BEC8ACDB}" dt="2023-12-23T12:29:50.550" v="30" actId="478"/>
+          <ac:picMkLst>
+            <pc:docMk/>
+            <pc:sldMk cId="3003328585" sldId="259"/>
+            <ac:picMk id="10" creationId="{01429F35-C277-3674-1F2F-D094F3F470E1}"/>
+          </ac:picMkLst>
+        </pc:picChg>
+        <pc:picChg chg="add del mod">
+          <ac:chgData name="Amadeus Galvão" userId="90256b45929bb397" providerId="LiveId" clId="{5CB6677E-6AAC-47AE-9EA1-4178BEC8ACDB}" dt="2023-12-26T23:20:30.353" v="117" actId="478"/>
+          <ac:picMkLst>
+            <pc:docMk/>
+            <pc:sldMk cId="3003328585" sldId="259"/>
+            <ac:picMk id="12" creationId="{F8D08DA3-D145-7165-30FF-D2EF612C66B1}"/>
+          </ac:picMkLst>
+        </pc:picChg>
+        <pc:picChg chg="add del mod">
+          <ac:chgData name="Amadeus Galvão" userId="90256b45929bb397" providerId="LiveId" clId="{5CB6677E-6AAC-47AE-9EA1-4178BEC8ACDB}" dt="2023-12-26T23:20:30.843" v="118" actId="478"/>
+          <ac:picMkLst>
+            <pc:docMk/>
+            <pc:sldMk cId="3003328585" sldId="259"/>
+            <ac:picMk id="14" creationId="{0FFDDF1F-3961-12A6-4347-2E05E73D4476}"/>
+          </ac:picMkLst>
+        </pc:picChg>
+        <pc:picChg chg="add mod">
+          <ac:chgData name="Amadeus Galvão" userId="90256b45929bb397" providerId="LiveId" clId="{5CB6677E-6AAC-47AE-9EA1-4178BEC8ACDB}" dt="2023-12-26T23:20:59.248" v="129" actId="26606"/>
+          <ac:picMkLst>
+            <pc:docMk/>
+            <pc:sldMk cId="3003328585" sldId="259"/>
+            <ac:picMk id="16" creationId="{396E9EEB-31AF-2BE5-E170-AEC817C4B6DA}"/>
+          </ac:picMkLst>
+        </pc:picChg>
+        <pc:picChg chg="del">
+          <ac:chgData name="Amadeus Galvão" userId="90256b45929bb397" providerId="LiveId" clId="{5CB6677E-6AAC-47AE-9EA1-4178BEC8ACDB}" dt="2023-12-23T12:07:53.550" v="2" actId="478"/>
+          <ac:picMkLst>
+            <pc:docMk/>
+            <pc:sldMk cId="3003328585" sldId="259"/>
+            <ac:picMk id="2050" creationId="{00000000-0000-0000-0000-000000000000}"/>
+          </ac:picMkLst>
+        </pc:picChg>
+        <pc:picChg chg="del">
+          <ac:chgData name="Amadeus Galvão" userId="90256b45929bb397" providerId="LiveId" clId="{5CB6677E-6AAC-47AE-9EA1-4178BEC8ACDB}" dt="2023-12-23T12:07:50.688" v="1" actId="478"/>
+          <ac:picMkLst>
+            <pc:docMk/>
+            <pc:sldMk cId="3003328585" sldId="259"/>
+            <ac:picMk id="2051" creationId="{00000000-0000-0000-0000-000000000000}"/>
+          </ac:picMkLst>
+        </pc:picChg>
+      </pc:sldChg>
+      <pc:sldChg chg="addSp delSp modSp add mod setBg">
+        <pc:chgData name="Amadeus Galvão" userId="90256b45929bb397" providerId="LiveId" clId="{5CB6677E-6AAC-47AE-9EA1-4178BEC8ACDB}" dt="2023-12-26T23:24:19.798" v="151" actId="1076"/>
+        <pc:sldMkLst>
+          <pc:docMk/>
+          <pc:sldMk cId="813212929" sldId="260"/>
+        </pc:sldMkLst>
+        <pc:spChg chg="mod ord">
+          <ac:chgData name="Amadeus Galvão" userId="90256b45929bb397" providerId="LiveId" clId="{5CB6677E-6AAC-47AE-9EA1-4178BEC8ACDB}" dt="2023-12-26T23:24:07.873" v="149" actId="26606"/>
+          <ac:spMkLst>
+            <pc:docMk/>
+            <pc:sldMk cId="813212929" sldId="260"/>
+            <ac:spMk id="4" creationId="{00000000-0000-0000-0000-000000000000}"/>
+          </ac:spMkLst>
+        </pc:spChg>
+        <pc:spChg chg="add del">
+          <ac:chgData name="Amadeus Galvão" userId="90256b45929bb397" providerId="LiveId" clId="{5CB6677E-6AAC-47AE-9EA1-4178BEC8ACDB}" dt="2023-12-26T23:23:38.565" v="137" actId="26606"/>
+          <ac:spMkLst>
+            <pc:docMk/>
+            <pc:sldMk cId="813212929" sldId="260"/>
+            <ac:spMk id="18" creationId="{37C89E4B-3C9F-44B9-8B86-D9E3D112D8EC}"/>
+          </ac:spMkLst>
+        </pc:spChg>
+        <pc:spChg chg="add del">
+          <ac:chgData name="Amadeus Galvão" userId="90256b45929bb397" providerId="LiveId" clId="{5CB6677E-6AAC-47AE-9EA1-4178BEC8ACDB}" dt="2023-12-26T23:23:43.381" v="142" actId="26606"/>
+          <ac:spMkLst>
+            <pc:docMk/>
+            <pc:sldMk cId="813212929" sldId="260"/>
+            <ac:spMk id="26" creationId="{BEBFA723-5A7B-472D-ABD7-1526B8D3A38B}"/>
+          </ac:spMkLst>
+        </pc:spChg>
+        <pc:spChg chg="add del">
+          <ac:chgData name="Amadeus Galvão" userId="90256b45929bb397" providerId="LiveId" clId="{5CB6677E-6AAC-47AE-9EA1-4178BEC8ACDB}" dt="2023-12-26T23:23:43.381" v="142" actId="26606"/>
+          <ac:spMkLst>
+            <pc:docMk/>
+            <pc:sldMk cId="813212929" sldId="260"/>
+            <ac:spMk id="27" creationId="{A6B27065-399A-4CF7-BF70-CF79B9848FC1}"/>
+          </ac:spMkLst>
+        </pc:spChg>
+        <pc:spChg chg="add del">
+          <ac:chgData name="Amadeus Galvão" userId="90256b45929bb397" providerId="LiveId" clId="{5CB6677E-6AAC-47AE-9EA1-4178BEC8ACDB}" dt="2023-12-26T23:24:07.873" v="149" actId="26606"/>
+          <ac:spMkLst>
+            <pc:docMk/>
+            <pc:sldMk cId="813212929" sldId="260"/>
+            <ac:spMk id="33" creationId="{6DBF50F6-DD88-4D9F-B7D3-79B989980940}"/>
+          </ac:spMkLst>
+        </pc:spChg>
+        <pc:spChg chg="add del">
+          <ac:chgData name="Amadeus Galvão" userId="90256b45929bb397" providerId="LiveId" clId="{5CB6677E-6AAC-47AE-9EA1-4178BEC8ACDB}" dt="2023-12-26T23:24:07.873" v="149" actId="26606"/>
+          <ac:spMkLst>
+            <pc:docMk/>
+            <pc:sldMk cId="813212929" sldId="260"/>
+            <ac:spMk id="34" creationId="{916BBDC2-6929-469E-B7C4-A03E77BF94B0}"/>
+          </ac:spMkLst>
+        </pc:spChg>
+        <pc:grpChg chg="add del">
+          <ac:chgData name="Amadeus Galvão" userId="90256b45929bb397" providerId="LiveId" clId="{5CB6677E-6AAC-47AE-9EA1-4178BEC8ACDB}" dt="2023-12-26T23:23:43.381" v="142" actId="26606"/>
+          <ac:grpSpMkLst>
+            <pc:docMk/>
+            <pc:sldMk cId="813212929" sldId="260"/>
+            <ac:grpSpMk id="28" creationId="{CF22986C-DDF7-4109-9D6A-006800D6B041}"/>
+          </ac:grpSpMkLst>
+        </pc:grpChg>
+        <pc:grpChg chg="add del">
+          <ac:chgData name="Amadeus Galvão" userId="90256b45929bb397" providerId="LiveId" clId="{5CB6677E-6AAC-47AE-9EA1-4178BEC8ACDB}" dt="2023-12-26T23:24:07.873" v="149" actId="26606"/>
+          <ac:grpSpMkLst>
+            <pc:docMk/>
+            <pc:sldMk cId="813212929" sldId="260"/>
+            <ac:grpSpMk id="35" creationId="{C344E6B5-C9F5-4338-9E33-003B12373104}"/>
+          </ac:grpSpMkLst>
+        </pc:grpChg>
+        <pc:grpChg chg="add del">
+          <ac:chgData name="Amadeus Galvão" userId="90256b45929bb397" providerId="LiveId" clId="{5CB6677E-6AAC-47AE-9EA1-4178BEC8ACDB}" dt="2023-12-26T23:24:07.873" v="149" actId="26606"/>
+          <ac:grpSpMkLst>
+            <pc:docMk/>
+            <pc:sldMk cId="813212929" sldId="260"/>
+            <ac:grpSpMk id="40" creationId="{FDFEDBF7-8E2C-46B8-9095-AE1D77E21773}"/>
+          </ac:grpSpMkLst>
+        </pc:grpChg>
+        <pc:picChg chg="add del mod">
+          <ac:chgData name="Amadeus Galvão" userId="90256b45929bb397" providerId="LiveId" clId="{5CB6677E-6AAC-47AE-9EA1-4178BEC8ACDB}" dt="2023-12-23T12:53:06.673" v="92" actId="478"/>
+          <ac:picMkLst>
+            <pc:docMk/>
+            <pc:sldMk cId="813212929" sldId="260"/>
+            <ac:picMk id="3" creationId="{F0758705-32D1-A77E-F372-ABC0588E61B3}"/>
+          </ac:picMkLst>
+        </pc:picChg>
+        <pc:picChg chg="add del mod">
+          <ac:chgData name="Amadeus Galvão" userId="90256b45929bb397" providerId="LiveId" clId="{5CB6677E-6AAC-47AE-9EA1-4178BEC8ACDB}" dt="2023-12-23T12:53:07.237" v="93" actId="478"/>
+          <ac:picMkLst>
+            <pc:docMk/>
+            <pc:sldMk cId="813212929" sldId="260"/>
+            <ac:picMk id="6" creationId="{07401524-38BE-5011-FF52-D8BB4E35FCC5}"/>
+          </ac:picMkLst>
+        </pc:picChg>
+        <pc:picChg chg="add del mod">
+          <ac:chgData name="Amadeus Galvão" userId="90256b45929bb397" providerId="LiveId" clId="{5CB6677E-6AAC-47AE-9EA1-4178BEC8ACDB}" dt="2023-12-26T23:23:26.097" v="131" actId="478"/>
+          <ac:picMkLst>
+            <pc:docMk/>
+            <pc:sldMk cId="813212929" sldId="260"/>
+            <ac:picMk id="8" creationId="{F01CC32C-AAC9-312A-4C86-626B08B98549}"/>
+          </ac:picMkLst>
+        </pc:picChg>
+        <pc:picChg chg="add del mod">
+          <ac:chgData name="Amadeus Galvão" userId="90256b45929bb397" providerId="LiveId" clId="{5CB6677E-6AAC-47AE-9EA1-4178BEC8ACDB}" dt="2023-12-26T23:23:26.097" v="131" actId="478"/>
+          <ac:picMkLst>
+            <pc:docMk/>
+            <pc:sldMk cId="813212929" sldId="260"/>
+            <ac:picMk id="10" creationId="{73610661-06DF-8C7F-69E9-C1F3A2D18C6A}"/>
+          </ac:picMkLst>
+        </pc:picChg>
+        <pc:picChg chg="del">
+          <ac:chgData name="Amadeus Galvão" userId="90256b45929bb397" providerId="LiveId" clId="{5CB6677E-6AAC-47AE-9EA1-4178BEC8ACDB}" dt="2023-12-23T12:49:55.422" v="68" actId="478"/>
+          <ac:picMkLst>
+            <pc:docMk/>
+            <pc:sldMk cId="813212929" sldId="260"/>
+            <ac:picMk id="12" creationId="{F8D08DA3-D145-7165-30FF-D2EF612C66B1}"/>
+          </ac:picMkLst>
+        </pc:picChg>
+        <pc:picChg chg="add mod">
+          <ac:chgData name="Amadeus Galvão" userId="90256b45929bb397" providerId="LiveId" clId="{5CB6677E-6AAC-47AE-9EA1-4178BEC8ACDB}" dt="2023-12-26T23:24:19.798" v="151" actId="1076"/>
+          <ac:picMkLst>
+            <pc:docMk/>
+            <pc:sldMk cId="813212929" sldId="260"/>
+            <ac:picMk id="13" creationId="{05343547-47E3-01FE-2F73-B8F3376447A9}"/>
+          </ac:picMkLst>
+        </pc:picChg>
+        <pc:picChg chg="del">
+          <ac:chgData name="Amadeus Galvão" userId="90256b45929bb397" providerId="LiveId" clId="{5CB6677E-6AAC-47AE-9EA1-4178BEC8ACDB}" dt="2023-12-23T12:49:54.903" v="67" actId="478"/>
+          <ac:picMkLst>
+            <pc:docMk/>
+            <pc:sldMk cId="813212929" sldId="260"/>
+            <ac:picMk id="14" creationId="{0FFDDF1F-3961-12A6-4347-2E05E73D4476}"/>
+          </ac:picMkLst>
+        </pc:picChg>
+        <pc:cxnChg chg="add del">
+          <ac:chgData name="Amadeus Galvão" userId="90256b45929bb397" providerId="LiveId" clId="{5CB6677E-6AAC-47AE-9EA1-4178BEC8ACDB}" dt="2023-12-26T23:23:38.565" v="137" actId="26606"/>
+          <ac:cxnSpMkLst>
+            <pc:docMk/>
+            <pc:sldMk cId="813212929" sldId="260"/>
+            <ac:cxnSpMk id="20" creationId="{AA2EAA10-076F-46BD-8F0F-B9A2FB77A85C}"/>
+          </ac:cxnSpMkLst>
+        </pc:cxnChg>
+        <pc:cxnChg chg="add del">
+          <ac:chgData name="Amadeus Galvão" userId="90256b45929bb397" providerId="LiveId" clId="{5CB6677E-6AAC-47AE-9EA1-4178BEC8ACDB}" dt="2023-12-26T23:23:38.565" v="137" actId="26606"/>
+          <ac:cxnSpMkLst>
+            <pc:docMk/>
+            <pc:sldMk cId="813212929" sldId="260"/>
+            <ac:cxnSpMk id="22" creationId="{D891E407-403B-4764-86C9-33A56D3BCAA3}"/>
+          </ac:cxnSpMkLst>
+        </pc:cxnChg>
+        <pc:cxnChg chg="add del">
+          <ac:chgData name="Amadeus Galvão" userId="90256b45929bb397" providerId="LiveId" clId="{5CB6677E-6AAC-47AE-9EA1-4178BEC8ACDB}" dt="2023-12-26T23:23:39.961" v="140" actId="26606"/>
+          <ac:cxnSpMkLst>
+            <pc:docMk/>
+            <pc:sldMk cId="813212929" sldId="260"/>
+            <ac:cxnSpMk id="24" creationId="{7667AA61-5C27-F30F-D229-06CBE5709F33}"/>
+          </ac:cxnSpMkLst>
+        </pc:cxnChg>
+      </pc:sldChg>
+      <pc:sldChg chg="add del">
+        <pc:chgData name="Amadeus Galvão" userId="90256b45929bb397" providerId="LiveId" clId="{5CB6677E-6AAC-47AE-9EA1-4178BEC8ACDB}" dt="2023-12-26T23:21:11.564" v="130" actId="47"/>
+        <pc:sldMkLst>
+          <pc:docMk/>
+          <pc:sldMk cId="444773438" sldId="261"/>
+        </pc:sldMkLst>
+      </pc:sldChg>
+      <pc:sldChg chg="addSp delSp modSp add mod ord">
+        <pc:chgData name="Amadeus Galvão" userId="90256b45929bb397" providerId="LiveId" clId="{5CB6677E-6AAC-47AE-9EA1-4178BEC8ACDB}" dt="2023-12-27T00:03:22.794" v="206"/>
+        <pc:sldMkLst>
+          <pc:docMk/>
+          <pc:sldMk cId="3851458727" sldId="261"/>
+        </pc:sldMkLst>
+        <pc:spChg chg="mod">
+          <ac:chgData name="Amadeus Galvão" userId="90256b45929bb397" providerId="LiveId" clId="{5CB6677E-6AAC-47AE-9EA1-4178BEC8ACDB}" dt="2023-12-26T23:40:33.377" v="160"/>
+          <ac:spMkLst>
+            <pc:docMk/>
+            <pc:sldMk cId="3851458727" sldId="261"/>
+            <ac:spMk id="4" creationId="{00000000-0000-0000-0000-000000000000}"/>
+          </ac:spMkLst>
+        </pc:spChg>
+        <pc:picChg chg="add mod">
+          <ac:chgData name="Amadeus Galvão" userId="90256b45929bb397" providerId="LiveId" clId="{5CB6677E-6AAC-47AE-9EA1-4178BEC8ACDB}" dt="2023-12-26T23:39:37.604" v="158" actId="1076"/>
+          <ac:picMkLst>
+            <pc:docMk/>
+            <pc:sldMk cId="3851458727" sldId="261"/>
+            <ac:picMk id="3" creationId="{48DD8BAF-83BE-4186-8746-7F81379C7845}"/>
+          </ac:picMkLst>
+        </pc:picChg>
+        <pc:picChg chg="del">
+          <ac:chgData name="Amadeus Galvão" userId="90256b45929bb397" providerId="LiveId" clId="{5CB6677E-6AAC-47AE-9EA1-4178BEC8ACDB}" dt="2023-12-26T23:39:28.562" v="153" actId="478"/>
+          <ac:picMkLst>
+            <pc:docMk/>
+            <pc:sldMk cId="3851458727" sldId="261"/>
+            <ac:picMk id="13" creationId="{05343547-47E3-01FE-2F73-B8F3376447A9}"/>
+          </ac:picMkLst>
+        </pc:picChg>
+      </pc:sldChg>
+      <pc:sldChg chg="addSp delSp modSp add mod ord">
+        <pc:chgData name="Amadeus Galvão" userId="90256b45929bb397" providerId="LiveId" clId="{5CB6677E-6AAC-47AE-9EA1-4178BEC8ACDB}" dt="2023-12-27T00:05:34.337" v="210"/>
+        <pc:sldMkLst>
+          <pc:docMk/>
+          <pc:sldMk cId="1499978090" sldId="262"/>
+        </pc:sldMkLst>
+        <pc:spChg chg="mod">
+          <ac:chgData name="Amadeus Galvão" userId="90256b45929bb397" providerId="LiveId" clId="{5CB6677E-6AAC-47AE-9EA1-4178BEC8ACDB}" dt="2023-12-26T23:51:27.055" v="188"/>
+          <ac:spMkLst>
+            <pc:docMk/>
+            <pc:sldMk cId="1499978090" sldId="262"/>
+            <ac:spMk id="4" creationId="{00000000-0000-0000-0000-000000000000}"/>
+          </ac:spMkLst>
+        </pc:spChg>
+        <pc:picChg chg="del">
+          <ac:chgData name="Amadeus Galvão" userId="90256b45929bb397" providerId="LiveId" clId="{5CB6677E-6AAC-47AE-9EA1-4178BEC8ACDB}" dt="2023-12-26T23:49:44.063" v="162" actId="478"/>
+          <ac:picMkLst>
+            <pc:docMk/>
+            <pc:sldMk cId="1499978090" sldId="262"/>
+            <ac:picMk id="3" creationId="{48DD8BAF-83BE-4186-8746-7F81379C7845}"/>
+          </ac:picMkLst>
+        </pc:picChg>
+        <pc:picChg chg="add mod">
+          <ac:chgData name="Amadeus Galvão" userId="90256b45929bb397" providerId="LiveId" clId="{5CB6677E-6AAC-47AE-9EA1-4178BEC8ACDB}" dt="2023-12-26T23:50:50.017" v="186" actId="1035"/>
+          <ac:picMkLst>
+            <pc:docMk/>
+            <pc:sldMk cId="1499978090" sldId="262"/>
+            <ac:picMk id="5" creationId="{64BC7AD7-6B93-BE60-F84B-35B4EBD39FDD}"/>
+          </ac:picMkLst>
+        </pc:picChg>
+      </pc:sldChg>
+      <pc:sldChg chg="addSp delSp modSp add mod ord">
+        <pc:chgData name="Amadeus Galvão" userId="90256b45929bb397" providerId="LiveId" clId="{5CB6677E-6AAC-47AE-9EA1-4178BEC8ACDB}" dt="2023-12-27T00:02:11.307" v="202"/>
+        <pc:sldMkLst>
+          <pc:docMk/>
+          <pc:sldMk cId="781811344" sldId="263"/>
+        </pc:sldMkLst>
+        <pc:spChg chg="mod">
+          <ac:chgData name="Amadeus Galvão" userId="90256b45929bb397" providerId="LiveId" clId="{5CB6677E-6AAC-47AE-9EA1-4178BEC8ACDB}" dt="2023-12-27T00:02:04.471" v="200" actId="1076"/>
+          <ac:spMkLst>
+            <pc:docMk/>
+            <pc:sldMk cId="781811344" sldId="263"/>
+            <ac:spMk id="4" creationId="{00000000-0000-0000-0000-000000000000}"/>
+          </ac:spMkLst>
+        </pc:spChg>
+        <pc:picChg chg="add mod">
+          <ac:chgData name="Amadeus Galvão" userId="90256b45929bb397" providerId="LiveId" clId="{5CB6677E-6AAC-47AE-9EA1-4178BEC8ACDB}" dt="2023-12-27T00:00:00.562" v="197" actId="1076"/>
+          <ac:picMkLst>
+            <pc:docMk/>
+            <pc:sldMk cId="781811344" sldId="263"/>
+            <ac:picMk id="3" creationId="{9F283E9C-AC07-6F33-3D80-0C81C320E90D}"/>
+          </ac:picMkLst>
+        </pc:picChg>
+        <pc:picChg chg="del">
+          <ac:chgData name="Amadeus Galvão" userId="90256b45929bb397" providerId="LiveId" clId="{5CB6677E-6AAC-47AE-9EA1-4178BEC8ACDB}" dt="2023-12-26T23:59:42.331" v="190" actId="478"/>
+          <ac:picMkLst>
+            <pc:docMk/>
+            <pc:sldMk cId="781811344" sldId="263"/>
+            <ac:picMk id="5" creationId="{64BC7AD7-6B93-BE60-F84B-35B4EBD39FDD}"/>
+          </ac:picMkLst>
+        </pc:picChg>
+      </pc:sldChg>
+      <pc:sldChg chg="modSp add mod">
+        <pc:chgData name="Amadeus Galvão" userId="90256b45929bb397" providerId="LiveId" clId="{5CB6677E-6AAC-47AE-9EA1-4178BEC8ACDB}" dt="2023-12-27T00:09:08.514" v="246" actId="1076"/>
+        <pc:sldMkLst>
+          <pc:docMk/>
+          <pc:sldMk cId="2486663059" sldId="264"/>
+        </pc:sldMkLst>
+        <pc:spChg chg="mod">
+          <ac:chgData name="Amadeus Galvão" userId="90256b45929bb397" providerId="LiveId" clId="{5CB6677E-6AAC-47AE-9EA1-4178BEC8ACDB}" dt="2023-12-27T00:09:08.514" v="246" actId="1076"/>
+          <ac:spMkLst>
+            <pc:docMk/>
+            <pc:sldMk cId="2486663059" sldId="264"/>
+            <ac:spMk id="4" creationId="{00000000-0000-0000-0000-000000000000}"/>
+          </ac:spMkLst>
+        </pc:spChg>
+      </pc:sldChg>
+      <pc:sldChg chg="addSp delSp modSp add mod">
+        <pc:chgData name="Amadeus Galvão" userId="90256b45929bb397" providerId="LiveId" clId="{5CB6677E-6AAC-47AE-9EA1-4178BEC8ACDB}" dt="2023-12-27T00:21:31.154" v="255" actId="1076"/>
+        <pc:sldMkLst>
+          <pc:docMk/>
+          <pc:sldMk cId="3364031938" sldId="265"/>
+        </pc:sldMkLst>
+        <pc:spChg chg="mod">
+          <ac:chgData name="Amadeus Galvão" userId="90256b45929bb397" providerId="LiveId" clId="{5CB6677E-6AAC-47AE-9EA1-4178BEC8ACDB}" dt="2023-12-27T00:09:17.447" v="250" actId="6549"/>
+          <ac:spMkLst>
+            <pc:docMk/>
+            <pc:sldMk cId="3364031938" sldId="265"/>
+            <ac:spMk id="4" creationId="{00000000-0000-0000-0000-000000000000}"/>
+          </ac:spMkLst>
+        </pc:spChg>
+        <pc:picChg chg="add mod">
+          <ac:chgData name="Amadeus Galvão" userId="90256b45929bb397" providerId="LiveId" clId="{5CB6677E-6AAC-47AE-9EA1-4178BEC8ACDB}" dt="2023-12-27T00:21:31.154" v="255" actId="1076"/>
+          <ac:picMkLst>
+            <pc:docMk/>
+            <pc:sldMk cId="3364031938" sldId="265"/>
+            <ac:picMk id="3" creationId="{5ED372F4-3DAB-72A3-331C-14316608B385}"/>
+          </ac:picMkLst>
+        </pc:picChg>
+        <pc:picChg chg="del">
+          <ac:chgData name="Amadeus Galvão" userId="90256b45929bb397" providerId="LiveId" clId="{5CB6677E-6AAC-47AE-9EA1-4178BEC8ACDB}" dt="2023-12-27T00:09:13.889" v="248" actId="478"/>
+          <ac:picMkLst>
+            <pc:docMk/>
+            <pc:sldMk cId="3364031938" sldId="265"/>
+            <ac:picMk id="13" creationId="{05343547-47E3-01FE-2F73-B8F3376447A9}"/>
+          </ac:picMkLst>
+        </pc:picChg>
+      </pc:sldChg>
+    </pc:docChg>
+  </pc:docChgLst>
+</pc:chgInfo>
 </file>
 
 <file path=ppt/slideLayouts/slideLayout1.xml><?xml version="1.0" encoding="utf-8"?>
@@ -147,10 +677,9 @@
           <a:lstStyle/>
           <a:p>
             <a:r>
-              <a:rPr lang="pt-BR" smtClean="0"/>
+              <a:rPr lang="pt-BR"/>
               <a:t>Clique para editar o estilo do título mestre</a:t>
             </a:r>
-            <a:endParaRPr lang="pt-BR"/>
           </a:p>
         </p:txBody>
       </p:sp>
@@ -266,10 +795,9 @@
           </a:lstStyle>
           <a:p>
             <a:r>
-              <a:rPr lang="pt-BR" smtClean="0"/>
+              <a:rPr lang="pt-BR"/>
               <a:t>Clique para editar o estilo do subtítulo mestre</a:t>
             </a:r>
-            <a:endParaRPr lang="pt-BR"/>
           </a:p>
         </p:txBody>
       </p:sp>
@@ -290,7 +818,7 @@
           <a:p>
             <a:fld id="{757CD562-4E80-4770-BCEF-F0085877D125}" type="datetimeFigureOut">
               <a:rPr lang="pt-BR" smtClean="0"/>
-              <a:t>22/12/2023</a:t>
+              <a:t>23/12/2023</a:t>
             </a:fld>
             <a:endParaRPr lang="pt-BR"/>
           </a:p>
@@ -379,10 +907,9 @@
           <a:lstStyle/>
           <a:p>
             <a:r>
-              <a:rPr lang="pt-BR" smtClean="0"/>
+              <a:rPr lang="pt-BR"/>
               <a:t>Clique para editar o estilo do título mestre</a:t>
             </a:r>
-            <a:endParaRPr lang="pt-BR"/>
           </a:p>
         </p:txBody>
       </p:sp>
@@ -403,38 +930,37 @@
           <a:p>
             <a:pPr lvl="0"/>
             <a:r>
-              <a:rPr lang="pt-BR" smtClean="0"/>
+              <a:rPr lang="pt-BR"/>
               <a:t>Clique para editar os estilos do texto mestre</a:t>
             </a:r>
           </a:p>
           <a:p>
             <a:pPr lvl="1"/>
             <a:r>
-              <a:rPr lang="pt-BR" smtClean="0"/>
+              <a:rPr lang="pt-BR"/>
               <a:t>Segundo nível</a:t>
             </a:r>
           </a:p>
           <a:p>
             <a:pPr lvl="2"/>
             <a:r>
-              <a:rPr lang="pt-BR" smtClean="0"/>
+              <a:rPr lang="pt-BR"/>
               <a:t>Terceiro nível</a:t>
             </a:r>
           </a:p>
           <a:p>
             <a:pPr lvl="3"/>
             <a:r>
-              <a:rPr lang="pt-BR" smtClean="0"/>
+              <a:rPr lang="pt-BR"/>
               <a:t>Quarto nível</a:t>
             </a:r>
           </a:p>
           <a:p>
             <a:pPr lvl="4"/>
             <a:r>
-              <a:rPr lang="pt-BR" smtClean="0"/>
+              <a:rPr lang="pt-BR"/>
               <a:t>Quinto nível</a:t>
             </a:r>
-            <a:endParaRPr lang="pt-BR"/>
           </a:p>
         </p:txBody>
       </p:sp>
@@ -455,7 +981,7 @@
           <a:p>
             <a:fld id="{757CD562-4E80-4770-BCEF-F0085877D125}" type="datetimeFigureOut">
               <a:rPr lang="pt-BR" smtClean="0"/>
-              <a:t>22/12/2023</a:t>
+              <a:t>23/12/2023</a:t>
             </a:fld>
             <a:endParaRPr lang="pt-BR"/>
           </a:p>
@@ -549,10 +1075,9 @@
           <a:lstStyle/>
           <a:p>
             <a:r>
-              <a:rPr lang="pt-BR" smtClean="0"/>
+              <a:rPr lang="pt-BR"/>
               <a:t>Clique para editar o estilo do título mestre</a:t>
             </a:r>
-            <a:endParaRPr lang="pt-BR"/>
           </a:p>
         </p:txBody>
       </p:sp>
@@ -578,38 +1103,37 @@
           <a:p>
             <a:pPr lvl="0"/>
             <a:r>
-              <a:rPr lang="pt-BR" smtClean="0"/>
+              <a:rPr lang="pt-BR"/>
               <a:t>Clique para editar os estilos do texto mestre</a:t>
             </a:r>
           </a:p>
           <a:p>
             <a:pPr lvl="1"/>
             <a:r>
-              <a:rPr lang="pt-BR" smtClean="0"/>
+              <a:rPr lang="pt-BR"/>
               <a:t>Segundo nível</a:t>
             </a:r>
           </a:p>
           <a:p>
             <a:pPr lvl="2"/>
             <a:r>
-              <a:rPr lang="pt-BR" smtClean="0"/>
+              <a:rPr lang="pt-BR"/>
               <a:t>Terceiro nível</a:t>
             </a:r>
           </a:p>
           <a:p>
             <a:pPr lvl="3"/>
             <a:r>
-              <a:rPr lang="pt-BR" smtClean="0"/>
+              <a:rPr lang="pt-BR"/>
               <a:t>Quarto nível</a:t>
             </a:r>
           </a:p>
           <a:p>
             <a:pPr lvl="4"/>
             <a:r>
-              <a:rPr lang="pt-BR" smtClean="0"/>
+              <a:rPr lang="pt-BR"/>
               <a:t>Quinto nível</a:t>
             </a:r>
-            <a:endParaRPr lang="pt-BR"/>
           </a:p>
         </p:txBody>
       </p:sp>
@@ -630,7 +1154,7 @@
           <a:p>
             <a:fld id="{757CD562-4E80-4770-BCEF-F0085877D125}" type="datetimeFigureOut">
               <a:rPr lang="pt-BR" smtClean="0"/>
-              <a:t>22/12/2023</a:t>
+              <a:t>23/12/2023</a:t>
             </a:fld>
             <a:endParaRPr lang="pt-BR"/>
           </a:p>
@@ -719,10 +1243,9 @@
           <a:lstStyle/>
           <a:p>
             <a:r>
-              <a:rPr lang="pt-BR" smtClean="0"/>
+              <a:rPr lang="pt-BR"/>
               <a:t>Clique para editar o estilo do título mestre</a:t>
             </a:r>
-            <a:endParaRPr lang="pt-BR"/>
           </a:p>
         </p:txBody>
       </p:sp>
@@ -743,38 +1266,37 @@
           <a:p>
             <a:pPr lvl="0"/>
             <a:r>
-              <a:rPr lang="pt-BR" smtClean="0"/>
+              <a:rPr lang="pt-BR"/>
               <a:t>Clique para editar os estilos do texto mestre</a:t>
             </a:r>
           </a:p>
           <a:p>
             <a:pPr lvl="1"/>
             <a:r>
-              <a:rPr lang="pt-BR" smtClean="0"/>
+              <a:rPr lang="pt-BR"/>
               <a:t>Segundo nível</a:t>
             </a:r>
           </a:p>
           <a:p>
             <a:pPr lvl="2"/>
             <a:r>
-              <a:rPr lang="pt-BR" smtClean="0"/>
+              <a:rPr lang="pt-BR"/>
               <a:t>Terceiro nível</a:t>
             </a:r>
           </a:p>
           <a:p>
             <a:pPr lvl="3"/>
             <a:r>
-              <a:rPr lang="pt-BR" smtClean="0"/>
+              <a:rPr lang="pt-BR"/>
               <a:t>Quarto nível</a:t>
             </a:r>
           </a:p>
           <a:p>
             <a:pPr lvl="4"/>
             <a:r>
-              <a:rPr lang="pt-BR" smtClean="0"/>
+              <a:rPr lang="pt-BR"/>
               <a:t>Quinto nível</a:t>
             </a:r>
-            <a:endParaRPr lang="pt-BR"/>
           </a:p>
         </p:txBody>
       </p:sp>
@@ -795,7 +1317,7 @@
           <a:p>
             <a:fld id="{757CD562-4E80-4770-BCEF-F0085877D125}" type="datetimeFigureOut">
               <a:rPr lang="pt-BR" smtClean="0"/>
-              <a:t>22/12/2023</a:t>
+              <a:t>23/12/2023</a:t>
             </a:fld>
             <a:endParaRPr lang="pt-BR"/>
           </a:p>
@@ -893,10 +1415,9 @@
           </a:lstStyle>
           <a:p>
             <a:r>
-              <a:rPr lang="pt-BR" smtClean="0"/>
+              <a:rPr lang="pt-BR"/>
               <a:t>Clique para editar o estilo do título mestre</a:t>
             </a:r>
-            <a:endParaRPr lang="pt-BR"/>
           </a:p>
         </p:txBody>
       </p:sp>
@@ -1013,7 +1534,7 @@
           <a:p>
             <a:pPr lvl="0"/>
             <a:r>
-              <a:rPr lang="pt-BR" smtClean="0"/>
+              <a:rPr lang="pt-BR"/>
               <a:t>Clique para editar os estilos do texto mestre</a:t>
             </a:r>
           </a:p>
@@ -1036,7 +1557,7 @@
           <a:p>
             <a:fld id="{757CD562-4E80-4770-BCEF-F0085877D125}" type="datetimeFigureOut">
               <a:rPr lang="pt-BR" smtClean="0"/>
-              <a:t>22/12/2023</a:t>
+              <a:t>23/12/2023</a:t>
             </a:fld>
             <a:endParaRPr lang="pt-BR"/>
           </a:p>
@@ -1125,10 +1646,9 @@
           <a:lstStyle/>
           <a:p>
             <a:r>
-              <a:rPr lang="pt-BR" smtClean="0"/>
+              <a:rPr lang="pt-BR"/>
               <a:t>Clique para editar o estilo do título mestre</a:t>
             </a:r>
-            <a:endParaRPr lang="pt-BR"/>
           </a:p>
         </p:txBody>
       </p:sp>
@@ -1182,38 +1702,37 @@
           <a:p>
             <a:pPr lvl="0"/>
             <a:r>
-              <a:rPr lang="pt-BR" smtClean="0"/>
+              <a:rPr lang="pt-BR"/>
               <a:t>Clique para editar os estilos do texto mestre</a:t>
             </a:r>
           </a:p>
           <a:p>
             <a:pPr lvl="1"/>
             <a:r>
-              <a:rPr lang="pt-BR" smtClean="0"/>
+              <a:rPr lang="pt-BR"/>
               <a:t>Segundo nível</a:t>
             </a:r>
           </a:p>
           <a:p>
             <a:pPr lvl="2"/>
             <a:r>
-              <a:rPr lang="pt-BR" smtClean="0"/>
+              <a:rPr lang="pt-BR"/>
               <a:t>Terceiro nível</a:t>
             </a:r>
           </a:p>
           <a:p>
             <a:pPr lvl="3"/>
             <a:r>
-              <a:rPr lang="pt-BR" smtClean="0"/>
+              <a:rPr lang="pt-BR"/>
               <a:t>Quarto nível</a:t>
             </a:r>
           </a:p>
           <a:p>
             <a:pPr lvl="4"/>
             <a:r>
-              <a:rPr lang="pt-BR" smtClean="0"/>
+              <a:rPr lang="pt-BR"/>
               <a:t>Quinto nível</a:t>
             </a:r>
-            <a:endParaRPr lang="pt-BR"/>
           </a:p>
         </p:txBody>
       </p:sp>
@@ -1267,38 +1786,37 @@
           <a:p>
             <a:pPr lvl="0"/>
             <a:r>
-              <a:rPr lang="pt-BR" smtClean="0"/>
+              <a:rPr lang="pt-BR"/>
               <a:t>Clique para editar os estilos do texto mestre</a:t>
             </a:r>
           </a:p>
           <a:p>
             <a:pPr lvl="1"/>
             <a:r>
-              <a:rPr lang="pt-BR" smtClean="0"/>
+              <a:rPr lang="pt-BR"/>
               <a:t>Segundo nível</a:t>
             </a:r>
           </a:p>
           <a:p>
             <a:pPr lvl="2"/>
             <a:r>
-              <a:rPr lang="pt-BR" smtClean="0"/>
+              <a:rPr lang="pt-BR"/>
               <a:t>Terceiro nível</a:t>
             </a:r>
           </a:p>
           <a:p>
             <a:pPr lvl="3"/>
             <a:r>
-              <a:rPr lang="pt-BR" smtClean="0"/>
+              <a:rPr lang="pt-BR"/>
               <a:t>Quarto nível</a:t>
             </a:r>
           </a:p>
           <a:p>
             <a:pPr lvl="4"/>
             <a:r>
-              <a:rPr lang="pt-BR" smtClean="0"/>
+              <a:rPr lang="pt-BR"/>
               <a:t>Quinto nível</a:t>
             </a:r>
-            <a:endParaRPr lang="pt-BR"/>
           </a:p>
         </p:txBody>
       </p:sp>
@@ -1319,7 +1837,7 @@
           <a:p>
             <a:fld id="{757CD562-4E80-4770-BCEF-F0085877D125}" type="datetimeFigureOut">
               <a:rPr lang="pt-BR" smtClean="0"/>
-              <a:t>22/12/2023</a:t>
+              <a:t>23/12/2023</a:t>
             </a:fld>
             <a:endParaRPr lang="pt-BR"/>
           </a:p>
@@ -1412,10 +1930,9 @@
           </a:lstStyle>
           <a:p>
             <a:r>
-              <a:rPr lang="pt-BR" smtClean="0"/>
+              <a:rPr lang="pt-BR"/>
               <a:t>Clique para editar o estilo do título mestre</a:t>
             </a:r>
-            <a:endParaRPr lang="pt-BR"/>
           </a:p>
         </p:txBody>
       </p:sp>
@@ -1478,7 +1995,7 @@
           <a:p>
             <a:pPr lvl="0"/>
             <a:r>
-              <a:rPr lang="pt-BR" smtClean="0"/>
+              <a:rPr lang="pt-BR"/>
               <a:t>Clique para editar os estilos do texto mestre</a:t>
             </a:r>
           </a:p>
@@ -1534,38 +2051,37 @@
           <a:p>
             <a:pPr lvl="0"/>
             <a:r>
-              <a:rPr lang="pt-BR" smtClean="0"/>
+              <a:rPr lang="pt-BR"/>
               <a:t>Clique para editar os estilos do texto mestre</a:t>
             </a:r>
           </a:p>
           <a:p>
             <a:pPr lvl="1"/>
             <a:r>
-              <a:rPr lang="pt-BR" smtClean="0"/>
+              <a:rPr lang="pt-BR"/>
               <a:t>Segundo nível</a:t>
             </a:r>
           </a:p>
           <a:p>
             <a:pPr lvl="2"/>
             <a:r>
-              <a:rPr lang="pt-BR" smtClean="0"/>
+              <a:rPr lang="pt-BR"/>
               <a:t>Terceiro nível</a:t>
             </a:r>
           </a:p>
           <a:p>
             <a:pPr lvl="3"/>
             <a:r>
-              <a:rPr lang="pt-BR" smtClean="0"/>
+              <a:rPr lang="pt-BR"/>
               <a:t>Quarto nível</a:t>
             </a:r>
           </a:p>
           <a:p>
             <a:pPr lvl="4"/>
             <a:r>
-              <a:rPr lang="pt-BR" smtClean="0"/>
+              <a:rPr lang="pt-BR"/>
               <a:t>Quinto nível</a:t>
             </a:r>
-            <a:endParaRPr lang="pt-BR"/>
           </a:p>
         </p:txBody>
       </p:sp>
@@ -1628,7 +2144,7 @@
           <a:p>
             <a:pPr lvl="0"/>
             <a:r>
-              <a:rPr lang="pt-BR" smtClean="0"/>
+              <a:rPr lang="pt-BR"/>
               <a:t>Clique para editar os estilos do texto mestre</a:t>
             </a:r>
           </a:p>
@@ -1684,38 +2200,37 @@
           <a:p>
             <a:pPr lvl="0"/>
             <a:r>
-              <a:rPr lang="pt-BR" smtClean="0"/>
+              <a:rPr lang="pt-BR"/>
               <a:t>Clique para editar os estilos do texto mestre</a:t>
             </a:r>
           </a:p>
           <a:p>
             <a:pPr lvl="1"/>
             <a:r>
-              <a:rPr lang="pt-BR" smtClean="0"/>
+              <a:rPr lang="pt-BR"/>
               <a:t>Segundo nível</a:t>
             </a:r>
           </a:p>
           <a:p>
             <a:pPr lvl="2"/>
             <a:r>
-              <a:rPr lang="pt-BR" smtClean="0"/>
+              <a:rPr lang="pt-BR"/>
               <a:t>Terceiro nível</a:t>
             </a:r>
           </a:p>
           <a:p>
             <a:pPr lvl="3"/>
             <a:r>
-              <a:rPr lang="pt-BR" smtClean="0"/>
+              <a:rPr lang="pt-BR"/>
               <a:t>Quarto nível</a:t>
             </a:r>
           </a:p>
           <a:p>
             <a:pPr lvl="4"/>
             <a:r>
-              <a:rPr lang="pt-BR" smtClean="0"/>
+              <a:rPr lang="pt-BR"/>
               <a:t>Quinto nível</a:t>
             </a:r>
-            <a:endParaRPr lang="pt-BR"/>
           </a:p>
         </p:txBody>
       </p:sp>
@@ -1736,7 +2251,7 @@
           <a:p>
             <a:fld id="{757CD562-4E80-4770-BCEF-F0085877D125}" type="datetimeFigureOut">
               <a:rPr lang="pt-BR" smtClean="0"/>
-              <a:t>22/12/2023</a:t>
+              <a:t>23/12/2023</a:t>
             </a:fld>
             <a:endParaRPr lang="pt-BR"/>
           </a:p>
@@ -1825,10 +2340,9 @@
           <a:lstStyle/>
           <a:p>
             <a:r>
-              <a:rPr lang="pt-BR" smtClean="0"/>
+              <a:rPr lang="pt-BR"/>
               <a:t>Clique para editar o estilo do título mestre</a:t>
             </a:r>
-            <a:endParaRPr lang="pt-BR"/>
           </a:p>
         </p:txBody>
       </p:sp>
@@ -1849,7 +2363,7 @@
           <a:p>
             <a:fld id="{757CD562-4E80-4770-BCEF-F0085877D125}" type="datetimeFigureOut">
               <a:rPr lang="pt-BR" smtClean="0"/>
-              <a:t>22/12/2023</a:t>
+              <a:t>23/12/2023</a:t>
             </a:fld>
             <a:endParaRPr lang="pt-BR"/>
           </a:p>
@@ -1939,7 +2453,7 @@
           <a:p>
             <a:fld id="{757CD562-4E80-4770-BCEF-F0085877D125}" type="datetimeFigureOut">
               <a:rPr lang="pt-BR" smtClean="0"/>
-              <a:t>22/12/2023</a:t>
+              <a:t>23/12/2023</a:t>
             </a:fld>
             <a:endParaRPr lang="pt-BR"/>
           </a:p>
@@ -2037,10 +2551,9 @@
           </a:lstStyle>
           <a:p>
             <a:r>
-              <a:rPr lang="pt-BR" smtClean="0"/>
+              <a:rPr lang="pt-BR"/>
               <a:t>Clique para editar o estilo do título mestre</a:t>
             </a:r>
-            <a:endParaRPr lang="pt-BR"/>
           </a:p>
         </p:txBody>
       </p:sp>
@@ -2094,38 +2607,37 @@
           <a:p>
             <a:pPr lvl="0"/>
             <a:r>
-              <a:rPr lang="pt-BR" smtClean="0"/>
+              <a:rPr lang="pt-BR"/>
               <a:t>Clique para editar os estilos do texto mestre</a:t>
             </a:r>
           </a:p>
           <a:p>
             <a:pPr lvl="1"/>
             <a:r>
-              <a:rPr lang="pt-BR" smtClean="0"/>
+              <a:rPr lang="pt-BR"/>
               <a:t>Segundo nível</a:t>
             </a:r>
           </a:p>
           <a:p>
             <a:pPr lvl="2"/>
             <a:r>
-              <a:rPr lang="pt-BR" smtClean="0"/>
+              <a:rPr lang="pt-BR"/>
               <a:t>Terceiro nível</a:t>
             </a:r>
           </a:p>
           <a:p>
             <a:pPr lvl="3"/>
             <a:r>
-              <a:rPr lang="pt-BR" smtClean="0"/>
+              <a:rPr lang="pt-BR"/>
               <a:t>Quarto nível</a:t>
             </a:r>
           </a:p>
           <a:p>
             <a:pPr lvl="4"/>
             <a:r>
-              <a:rPr lang="pt-BR" smtClean="0"/>
+              <a:rPr lang="pt-BR"/>
               <a:t>Quinto nível</a:t>
             </a:r>
-            <a:endParaRPr lang="pt-BR"/>
           </a:p>
         </p:txBody>
       </p:sp>
@@ -2188,7 +2700,7 @@
           <a:p>
             <a:pPr lvl="0"/>
             <a:r>
-              <a:rPr lang="pt-BR" smtClean="0"/>
+              <a:rPr lang="pt-BR"/>
               <a:t>Clique para editar os estilos do texto mestre</a:t>
             </a:r>
           </a:p>
@@ -2211,7 +2723,7 @@
           <a:p>
             <a:fld id="{757CD562-4E80-4770-BCEF-F0085877D125}" type="datetimeFigureOut">
               <a:rPr lang="pt-BR" smtClean="0"/>
-              <a:t>22/12/2023</a:t>
+              <a:t>23/12/2023</a:t>
             </a:fld>
             <a:endParaRPr lang="pt-BR"/>
           </a:p>
@@ -2309,10 +2821,9 @@
           </a:lstStyle>
           <a:p>
             <a:r>
-              <a:rPr lang="pt-BR" smtClean="0"/>
+              <a:rPr lang="pt-BR"/>
               <a:t>Clique para editar o estilo do título mestre</a:t>
             </a:r>
-            <a:endParaRPr lang="pt-BR"/>
           </a:p>
         </p:txBody>
       </p:sp>
@@ -2436,7 +2947,7 @@
           <a:p>
             <a:pPr lvl="0"/>
             <a:r>
-              <a:rPr lang="pt-BR" smtClean="0"/>
+              <a:rPr lang="pt-BR"/>
               <a:t>Clique para editar os estilos do texto mestre</a:t>
             </a:r>
           </a:p>
@@ -2459,7 +2970,7 @@
           <a:p>
             <a:fld id="{757CD562-4E80-4770-BCEF-F0085877D125}" type="datetimeFigureOut">
               <a:rPr lang="pt-BR" smtClean="0"/>
-              <a:t>22/12/2023</a:t>
+              <a:t>23/12/2023</a:t>
             </a:fld>
             <a:endParaRPr lang="pt-BR"/>
           </a:p>
@@ -2563,10 +3074,9 @@
           <a:lstStyle/>
           <a:p>
             <a:r>
-              <a:rPr lang="pt-BR" smtClean="0"/>
+              <a:rPr lang="pt-BR"/>
               <a:t>Clique para editar o estilo do título mestre</a:t>
             </a:r>
-            <a:endParaRPr lang="pt-BR"/>
           </a:p>
         </p:txBody>
       </p:sp>
@@ -2597,38 +3107,37 @@
           <a:p>
             <a:pPr lvl="0"/>
             <a:r>
-              <a:rPr lang="pt-BR" smtClean="0"/>
+              <a:rPr lang="pt-BR"/>
               <a:t>Clique para editar os estilos do texto mestre</a:t>
             </a:r>
           </a:p>
           <a:p>
             <a:pPr lvl="1"/>
             <a:r>
-              <a:rPr lang="pt-BR" smtClean="0"/>
+              <a:rPr lang="pt-BR"/>
               <a:t>Segundo nível</a:t>
             </a:r>
           </a:p>
           <a:p>
             <a:pPr lvl="2"/>
             <a:r>
-              <a:rPr lang="pt-BR" smtClean="0"/>
+              <a:rPr lang="pt-BR"/>
               <a:t>Terceiro nível</a:t>
             </a:r>
           </a:p>
           <a:p>
             <a:pPr lvl="3"/>
             <a:r>
-              <a:rPr lang="pt-BR" smtClean="0"/>
+              <a:rPr lang="pt-BR"/>
               <a:t>Quarto nível</a:t>
             </a:r>
           </a:p>
           <a:p>
             <a:pPr lvl="4"/>
             <a:r>
-              <a:rPr lang="pt-BR" smtClean="0"/>
+              <a:rPr lang="pt-BR"/>
               <a:t>Quinto nível</a:t>
             </a:r>
-            <a:endParaRPr lang="pt-BR"/>
           </a:p>
         </p:txBody>
       </p:sp>
@@ -2667,7 +3176,7 @@
           <a:p>
             <a:fld id="{757CD562-4E80-4770-BCEF-F0085877D125}" type="datetimeFigureOut">
               <a:rPr lang="pt-BR" smtClean="0"/>
-              <a:t>22/12/2023</a:t>
+              <a:t>23/12/2023</a:t>
             </a:fld>
             <a:endParaRPr lang="pt-BR"/>
           </a:p>
@@ -3061,13 +3570,13 @@
           <a:p>
             <a:pPr algn="ctr"/>
             <a:r>
-              <a:rPr lang="pt-BR" dirty="0" smtClean="0"/>
+              <a:rPr lang="pt-BR" dirty="0"/>
               <a:t>DESCRIÇÃO DO SISTEMA</a:t>
             </a:r>
           </a:p>
           <a:p>
             <a:pPr algn="ctr"/>
-            <a:endParaRPr lang="pt-BR" dirty="0" smtClean="0"/>
+            <a:endParaRPr lang="pt-BR" dirty="0"/>
           </a:p>
           <a:p>
             <a:pPr>
@@ -3076,12 +3585,8 @@
               </a:lnSpc>
             </a:pPr>
             <a:r>
-              <a:rPr lang="pt-BR" dirty="0" smtClean="0"/>
-              <a:t>Desenvolvimento de um </a:t>
-            </a:r>
-            <a:r>
               <a:rPr lang="pt-BR" dirty="0"/>
-              <a:t>sistema simples usando </a:t>
+              <a:t>Desenvolvimento de um sistema de ranking simples usando </a:t>
             </a:r>
             <a:r>
               <a:rPr lang="pt-BR" dirty="0" err="1"/>
@@ -3089,46 +3594,26 @@
             </a:r>
             <a:r>
               <a:rPr lang="pt-BR" dirty="0"/>
-              <a:t> para comunicação em tempo real entre um servidor </a:t>
-            </a:r>
-            <a:r>
-              <a:rPr lang="pt-BR" dirty="0" err="1"/>
-              <a:t>Python</a:t>
-            </a:r>
+              <a:t> para comunicação em tempo real entre um servidor Python e um cliente HTML. </a:t>
+            </a:r>
+          </a:p>
+          <a:p>
+            <a:endParaRPr lang="pt-BR" dirty="0"/>
+          </a:p>
+          <a:p>
+            <a:pPr algn="ctr"/>
+            <a:endParaRPr lang="pt-BR" dirty="0"/>
+          </a:p>
+          <a:p>
+            <a:pPr algn="ctr"/>
             <a:r>
               <a:rPr lang="pt-BR" dirty="0"/>
-              <a:t> </a:t>
-            </a:r>
-            <a:r>
-              <a:rPr lang="pt-BR" dirty="0" smtClean="0"/>
-              <a:t>e </a:t>
-            </a:r>
-            <a:r>
-              <a:rPr lang="pt-BR" dirty="0"/>
-              <a:t>um cliente </a:t>
-            </a:r>
-            <a:r>
-              <a:rPr lang="pt-BR" dirty="0" smtClean="0"/>
-              <a:t>HTML. </a:t>
-            </a:r>
-          </a:p>
-          <a:p>
+              <a:t>REQUISITOS FUNCIONAIS DO SISTEMA</a:t>
+            </a:r>
+          </a:p>
+          <a:p>
+            <a:pPr algn="ctr"/>
             <a:endParaRPr lang="pt-BR" dirty="0"/>
-          </a:p>
-          <a:p>
-            <a:pPr algn="ctr"/>
-            <a:endParaRPr lang="pt-BR" dirty="0" smtClean="0"/>
-          </a:p>
-          <a:p>
-            <a:pPr algn="ctr"/>
-            <a:r>
-              <a:rPr lang="pt-BR" dirty="0" smtClean="0"/>
-              <a:t>REQUISITOS FUNCIONAIS DO SISTEMA</a:t>
-            </a:r>
-          </a:p>
-          <a:p>
-            <a:pPr algn="ctr"/>
-            <a:endParaRPr lang="pt-BR" dirty="0" smtClean="0"/>
           </a:p>
           <a:p>
             <a:pPr>
@@ -3139,19 +3624,15 @@
               <a:buChar char="ü"/>
             </a:pPr>
             <a:r>
-              <a:rPr lang="pt-BR" dirty="0" smtClean="0"/>
-              <a:t> Permitir que um </a:t>
-            </a:r>
-            <a:r>
               <a:rPr lang="pt-BR" dirty="0"/>
-              <a:t>cliente se conectar ao servidor via </a:t>
-            </a:r>
-            <a:r>
-              <a:rPr lang="pt-BR" dirty="0" err="1" smtClean="0"/>
+              <a:t> Permitir que um cliente se conectar ao servidor via </a:t>
+            </a:r>
+            <a:r>
+              <a:rPr lang="pt-BR" dirty="0" err="1"/>
               <a:t>WebSocket</a:t>
             </a:r>
             <a:r>
-              <a:rPr lang="pt-BR" dirty="0" smtClean="0"/>
+              <a:rPr lang="pt-BR" dirty="0"/>
               <a:t>;</a:t>
             </a:r>
           </a:p>
@@ -3164,7 +3645,7 @@
               <a:buChar char="ü"/>
             </a:pPr>
             <a:r>
-              <a:rPr lang="pt-BR" dirty="0" smtClean="0"/>
+              <a:rPr lang="pt-BR" dirty="0"/>
               <a:t>Registrar alunos;</a:t>
             </a:r>
           </a:p>
@@ -3177,7 +3658,7 @@
               <a:buChar char="ü"/>
             </a:pPr>
             <a:r>
-              <a:rPr lang="pt-BR" dirty="0" smtClean="0"/>
+              <a:rPr lang="pt-BR" dirty="0"/>
               <a:t>Remover alunos;</a:t>
             </a:r>
           </a:p>
@@ -3190,16 +3671,8 @@
               <a:buChar char="ü"/>
             </a:pPr>
             <a:r>
-              <a:rPr lang="pt-BR" dirty="0" smtClean="0"/>
-              <a:t>Gerar relatórios </a:t>
-            </a:r>
-            <a:r>
               <a:rPr lang="pt-BR" dirty="0"/>
-              <a:t>em </a:t>
-            </a:r>
-            <a:r>
-              <a:rPr lang="pt-BR" dirty="0" smtClean="0"/>
-              <a:t>PDF;</a:t>
+              <a:t>Gerar relatórios em PDF;</a:t>
             </a:r>
           </a:p>
           <a:p>
@@ -3211,22 +3684,109 @@
               <a:buChar char="ü"/>
             </a:pPr>
             <a:r>
-              <a:rPr lang="pt-BR" dirty="0" smtClean="0"/>
-              <a:t>Visualizar a </a:t>
-            </a:r>
-            <a:r>
               <a:rPr lang="pt-BR" dirty="0"/>
-              <a:t>lista de alunos em tempo </a:t>
-            </a:r>
-            <a:r>
-              <a:rPr lang="pt-BR" dirty="0" smtClean="0"/>
-              <a:t>real;</a:t>
-            </a:r>
-            <a:endParaRPr lang="pt-BR" dirty="0"/>
+              <a:t>Visualizar a lista de alunos em tempo real;</a:t>
+            </a:r>
           </a:p>
         </p:txBody>
       </p:sp>
     </p:spTree>
+  </p:cSld>
+  <p:clrMapOvr>
+    <a:masterClrMapping/>
+  </p:clrMapOvr>
+</p:sld>
+</file>
+
+<file path=ppt/slides/slide10.xml><?xml version="1.0" encoding="utf-8"?>
+<p:sld xmlns:a="http://schemas.openxmlformats.org/drawingml/2006/main" xmlns:r="http://schemas.openxmlformats.org/officeDocument/2006/relationships" xmlns:p="http://schemas.openxmlformats.org/presentationml/2006/main">
+  <p:cSld>
+    <p:spTree>
+      <p:nvGrpSpPr>
+        <p:cNvPr id="1" name=""/>
+        <p:cNvGrpSpPr/>
+        <p:nvPr/>
+      </p:nvGrpSpPr>
+      <p:grpSpPr>
+        <a:xfrm>
+          <a:off x="0" y="0"/>
+          <a:ext cx="0" cy="0"/>
+          <a:chOff x="0" y="0"/>
+          <a:chExt cx="0" cy="0"/>
+        </a:xfrm>
+      </p:grpSpPr>
+      <p:sp>
+        <p:nvSpPr>
+          <p:cNvPr id="4" name="CaixaDeTexto 3"/>
+          <p:cNvSpPr txBox="1"/>
+          <p:nvPr/>
+        </p:nvSpPr>
+        <p:spPr>
+          <a:xfrm>
+            <a:off x="395536" y="260648"/>
+            <a:ext cx="8352928" cy="369332"/>
+          </a:xfrm>
+          <a:prstGeom prst="rect">
+            <a:avLst/>
+          </a:prstGeom>
+          <a:noFill/>
+        </p:spPr>
+        <p:txBody>
+          <a:bodyPr wrap="square" rtlCol="0">
+            <a:spAutoFit/>
+          </a:bodyPr>
+          <a:lstStyle/>
+          <a:p>
+            <a:pPr algn="ctr"/>
+            <a:r>
+              <a:rPr lang="pt-BR" dirty="0"/>
+              <a:t>GERAÇÃO E ENVIO DE RELATÓRIO PDF AOS CLIENTES</a:t>
+            </a:r>
+          </a:p>
+        </p:txBody>
+      </p:sp>
+      <p:pic>
+        <p:nvPicPr>
+          <p:cNvPr id="3" name="Imagem 2" descr="Texto&#10;&#10;Descrição gerada automaticamente">
+            <a:extLst>
+              <a:ext uri="{FF2B5EF4-FFF2-40B4-BE49-F238E27FC236}">
+                <a16:creationId xmlns:a16="http://schemas.microsoft.com/office/drawing/2014/main" id="{5ED372F4-3DAB-72A3-331C-14316608B385}"/>
+              </a:ext>
+            </a:extLst>
+          </p:cNvPr>
+          <p:cNvPicPr>
+            <a:picLocks noChangeAspect="1"/>
+          </p:cNvPicPr>
+          <p:nvPr/>
+        </p:nvPicPr>
+        <p:blipFill>
+          <a:blip r:embed="rId2">
+            <a:extLst>
+              <a:ext uri="{28A0092B-C50C-407E-A947-70E740481C1C}">
+                <a14:useLocalDpi xmlns:a14="http://schemas.microsoft.com/office/drawing/2010/main" val="0"/>
+              </a:ext>
+            </a:extLst>
+          </a:blip>
+          <a:stretch>
+            <a:fillRect/>
+          </a:stretch>
+        </p:blipFill>
+        <p:spPr>
+          <a:xfrm>
+            <a:off x="341784" y="1412776"/>
+            <a:ext cx="8460432" cy="4529441"/>
+          </a:xfrm>
+          <a:prstGeom prst="rect">
+            <a:avLst/>
+          </a:prstGeom>
+        </p:spPr>
+      </p:pic>
+    </p:spTree>
+    <p:extLst>
+      <p:ext uri="{BB962C8B-B14F-4D97-AF65-F5344CB8AC3E}">
+        <p14:creationId xmlns:p14="http://schemas.microsoft.com/office/powerpoint/2010/main" val="3364031938"/>
+      </p:ext>
+    </p:extLst>
   </p:cSld>
   <p:clrMapOvr>
     <a:masterClrMapping/>
@@ -3275,14 +3835,14 @@
           <a:p>
             <a:pPr algn="ctr"/>
             <a:r>
-              <a:rPr lang="pt-BR" dirty="0" smtClean="0"/>
+              <a:rPr lang="pt-BR" dirty="0"/>
               <a:t>CÓDIGO FONTE:</a:t>
             </a:r>
           </a:p>
           <a:p>
             <a:pPr algn="ctr"/>
             <a:r>
-              <a:rPr lang="pt-BR" dirty="0" smtClean="0"/>
+              <a:rPr lang="pt-BR" dirty="0"/>
               <a:t>SERVIDOR</a:t>
             </a:r>
           </a:p>
@@ -3293,7 +3853,7 @@
           <a:p>
             <a:pPr algn="ctr"/>
             <a:r>
-              <a:rPr lang="pt-BR" dirty="0" smtClean="0"/>
+              <a:rPr lang="pt-BR" dirty="0"/>
               <a:t>IMPORTAÇÃO DOS MÓDULOS</a:t>
             </a:r>
           </a:p>
@@ -3301,28 +3861,38 @@
       </p:sp>
       <p:pic>
         <p:nvPicPr>
-          <p:cNvPr id="1026" name="Picture 2" descr="C:\Users\wgalvao\Downloads\carbon.png"/>
+          <p:cNvPr id="3" name="Imagem 2" descr="Texto&#10;&#10;Descrição gerada automaticamente">
+            <a:extLst>
+              <a:ext uri="{FF2B5EF4-FFF2-40B4-BE49-F238E27FC236}">
+                <a16:creationId xmlns:a16="http://schemas.microsoft.com/office/drawing/2014/main" id="{CC0F4E9E-1C5E-B570-A7B9-8661E4A0CA93}"/>
+              </a:ext>
+            </a:extLst>
+          </p:cNvPr>
           <p:cNvPicPr>
-            <a:picLocks noChangeAspect="1" noChangeArrowheads="1"/>
+            <a:picLocks noChangeAspect="1"/>
           </p:cNvPicPr>
           <p:nvPr/>
         </p:nvPicPr>
         <p:blipFill>
-          <a:blip r:embed="rId2" cstate="print"/>
-          <a:srcRect/>
+          <a:blip r:embed="rId2">
+            <a:extLst>
+              <a:ext uri="{28A0092B-C50C-407E-A947-70E740481C1C}">
+                <a14:useLocalDpi xmlns:a14="http://schemas.microsoft.com/office/drawing/2010/main" val="0"/>
+              </a:ext>
+            </a:extLst>
+          </a:blip>
           <a:stretch>
             <a:fillRect/>
           </a:stretch>
         </p:blipFill>
-        <p:spPr bwMode="auto">
+        <p:spPr>
           <a:xfrm>
-            <a:off x="107504" y="1700808"/>
-            <a:ext cx="8901056" cy="2274402"/>
+            <a:off x="125760" y="2348880"/>
+            <a:ext cx="8892480" cy="1537485"/>
           </a:xfrm>
           <a:prstGeom prst="rect">
             <a:avLst/>
           </a:prstGeom>
-          <a:noFill/>
         </p:spPr>
       </p:pic>
     </p:spTree>
@@ -3358,6 +3928,102 @@
         </p:nvSpPr>
         <p:spPr>
           <a:xfrm>
+            <a:off x="395536" y="836712"/>
+            <a:ext cx="8352928" cy="369332"/>
+          </a:xfrm>
+          <a:prstGeom prst="rect">
+            <a:avLst/>
+          </a:prstGeom>
+          <a:noFill/>
+        </p:spPr>
+        <p:txBody>
+          <a:bodyPr wrap="square" rtlCol="0">
+            <a:spAutoFit/>
+          </a:bodyPr>
+          <a:lstStyle/>
+          <a:p>
+            <a:pPr algn="ctr"/>
+            <a:r>
+              <a:rPr lang="pt-BR" dirty="0"/>
+              <a:t>CONFIGURAÇÃO E EXECUÇÃO DO SERVIDOR WEBSOCKET</a:t>
+            </a:r>
+          </a:p>
+        </p:txBody>
+      </p:sp>
+      <p:pic>
+        <p:nvPicPr>
+          <p:cNvPr id="3" name="Imagem 2" descr="Texto&#10;&#10;Descrição gerada automaticamente com confiança baixa">
+            <a:extLst>
+              <a:ext uri="{FF2B5EF4-FFF2-40B4-BE49-F238E27FC236}">
+                <a16:creationId xmlns:a16="http://schemas.microsoft.com/office/drawing/2014/main" id="{9F283E9C-AC07-6F33-3D80-0C81C320E90D}"/>
+              </a:ext>
+            </a:extLst>
+          </p:cNvPr>
+          <p:cNvPicPr>
+            <a:picLocks noChangeAspect="1"/>
+          </p:cNvPicPr>
+          <p:nvPr/>
+        </p:nvPicPr>
+        <p:blipFill>
+          <a:blip r:embed="rId2">
+            <a:extLst>
+              <a:ext uri="{28A0092B-C50C-407E-A947-70E740481C1C}">
+                <a14:useLocalDpi xmlns:a14="http://schemas.microsoft.com/office/drawing/2010/main" val="0"/>
+              </a:ext>
+            </a:extLst>
+          </a:blip>
+          <a:stretch>
+            <a:fillRect/>
+          </a:stretch>
+        </p:blipFill>
+        <p:spPr>
+          <a:xfrm>
+            <a:off x="230614" y="2041547"/>
+            <a:ext cx="8682772" cy="2774906"/>
+          </a:xfrm>
+          <a:prstGeom prst="rect">
+            <a:avLst/>
+          </a:prstGeom>
+        </p:spPr>
+      </p:pic>
+    </p:spTree>
+    <p:extLst>
+      <p:ext uri="{BB962C8B-B14F-4D97-AF65-F5344CB8AC3E}">
+        <p14:creationId xmlns:p14="http://schemas.microsoft.com/office/powerpoint/2010/main" val="781811344"/>
+      </p:ext>
+    </p:extLst>
+  </p:cSld>
+  <p:clrMapOvr>
+    <a:masterClrMapping/>
+  </p:clrMapOvr>
+</p:sld>
+</file>
+
+<file path=ppt/slides/slide4.xml><?xml version="1.0" encoding="utf-8"?>
+<p:sld xmlns:a="http://schemas.openxmlformats.org/drawingml/2006/main" xmlns:r="http://schemas.openxmlformats.org/officeDocument/2006/relationships" xmlns:p="http://schemas.openxmlformats.org/presentationml/2006/main">
+  <p:cSld>
+    <p:spTree>
+      <p:nvGrpSpPr>
+        <p:cNvPr id="1" name=""/>
+        <p:cNvGrpSpPr/>
+        <p:nvPr/>
+      </p:nvGrpSpPr>
+      <p:grpSpPr>
+        <a:xfrm>
+          <a:off x="0" y="0"/>
+          <a:ext cx="0" cy="0"/>
+          <a:chOff x="0" y="0"/>
+          <a:chExt cx="0" cy="0"/>
+        </a:xfrm>
+      </p:grpSpPr>
+      <p:sp>
+        <p:nvSpPr>
+          <p:cNvPr id="4" name="CaixaDeTexto 3"/>
+          <p:cNvSpPr txBox="1"/>
+          <p:nvPr/>
+        </p:nvSpPr>
+        <p:spPr>
+          <a:xfrm>
             <a:off x="395536" y="260648"/>
             <a:ext cx="8352928" cy="1200329"/>
           </a:xfrm>
@@ -3374,14 +4040,14 @@
           <a:p>
             <a:pPr algn="ctr"/>
             <a:r>
-              <a:rPr lang="pt-BR" dirty="0" smtClean="0"/>
+              <a:rPr lang="pt-BR" dirty="0"/>
               <a:t>CÓDIGO FONTE:</a:t>
             </a:r>
           </a:p>
           <a:p>
             <a:pPr algn="ctr"/>
             <a:r>
-              <a:rPr lang="pt-BR" dirty="0" smtClean="0"/>
+              <a:rPr lang="pt-BR" dirty="0"/>
               <a:t>SERVIDOR</a:t>
             </a:r>
           </a:p>
@@ -3392,65 +4058,549 @@
           <a:p>
             <a:pPr algn="ctr"/>
             <a:r>
-              <a:rPr lang="pt-BR" dirty="0" smtClean="0"/>
-              <a:t>DEFINIÇÃO DA CLASSE ALUNO E INICIALIZAÇÃO DE CONJUNTOS</a:t>
+              <a:rPr lang="pt-BR" dirty="0"/>
+              <a:t>REGISTRO E COMUNICAÇÃO COM CLIENTES WEBSOCKET</a:t>
             </a:r>
           </a:p>
         </p:txBody>
       </p:sp>
       <p:pic>
         <p:nvPicPr>
-          <p:cNvPr id="2050" name="Picture 2" descr="C:\Users\wgalvao\Downloads\carbon (2).png"/>
+          <p:cNvPr id="3" name="Imagem 2" descr="Texto&#10;&#10;Descrição gerada automaticamente">
+            <a:extLst>
+              <a:ext uri="{FF2B5EF4-FFF2-40B4-BE49-F238E27FC236}">
+                <a16:creationId xmlns:a16="http://schemas.microsoft.com/office/drawing/2014/main" id="{48DD8BAF-83BE-4186-8746-7F81379C7845}"/>
+              </a:ext>
+            </a:extLst>
+          </p:cNvPr>
           <p:cNvPicPr>
-            <a:picLocks noChangeAspect="1" noChangeArrowheads="1"/>
+            <a:picLocks noChangeAspect="1"/>
           </p:cNvPicPr>
           <p:nvPr/>
         </p:nvPicPr>
         <p:blipFill>
-          <a:blip r:embed="rId2" cstate="print"/>
-          <a:srcRect/>
+          <a:blip r:embed="rId2">
+            <a:extLst>
+              <a:ext uri="{28A0092B-C50C-407E-A947-70E740481C1C}">
+                <a14:useLocalDpi xmlns:a14="http://schemas.microsoft.com/office/drawing/2010/main" val="0"/>
+              </a:ext>
+            </a:extLst>
+          </a:blip>
           <a:stretch>
             <a:fillRect/>
           </a:stretch>
         </p:blipFill>
-        <p:spPr bwMode="auto">
+        <p:spPr>
           <a:xfrm>
-            <a:off x="1259632" y="1484784"/>
-            <a:ext cx="6762259" cy="2974272"/>
+            <a:off x="197768" y="1844824"/>
+            <a:ext cx="8748464" cy="3972691"/>
+          </a:xfrm>
+          <a:prstGeom prst="rect">
+            <a:avLst/>
+          </a:prstGeom>
+        </p:spPr>
+      </p:pic>
+    </p:spTree>
+    <p:extLst>
+      <p:ext uri="{BB962C8B-B14F-4D97-AF65-F5344CB8AC3E}">
+        <p14:creationId xmlns:p14="http://schemas.microsoft.com/office/powerpoint/2010/main" val="3851458727"/>
+      </p:ext>
+    </p:extLst>
+  </p:cSld>
+  <p:clrMapOvr>
+    <a:masterClrMapping/>
+  </p:clrMapOvr>
+</p:sld>
+</file>
+
+<file path=ppt/slides/slide5.xml><?xml version="1.0" encoding="utf-8"?>
+<p:sld xmlns:a="http://schemas.openxmlformats.org/drawingml/2006/main" xmlns:r="http://schemas.openxmlformats.org/officeDocument/2006/relationships" xmlns:p="http://schemas.openxmlformats.org/presentationml/2006/main">
+  <p:cSld>
+    <p:spTree>
+      <p:nvGrpSpPr>
+        <p:cNvPr id="1" name=""/>
+        <p:cNvGrpSpPr/>
+        <p:nvPr/>
+      </p:nvGrpSpPr>
+      <p:grpSpPr>
+        <a:xfrm>
+          <a:off x="0" y="0"/>
+          <a:ext cx="0" cy="0"/>
+          <a:chOff x="0" y="0"/>
+          <a:chExt cx="0" cy="0"/>
+        </a:xfrm>
+      </p:grpSpPr>
+      <p:sp>
+        <p:nvSpPr>
+          <p:cNvPr id="4" name="CaixaDeTexto 3"/>
+          <p:cNvSpPr txBox="1"/>
+          <p:nvPr/>
+        </p:nvSpPr>
+        <p:spPr>
+          <a:xfrm>
+            <a:off x="395536" y="260648"/>
+            <a:ext cx="8352928" cy="1200329"/>
           </a:xfrm>
           <a:prstGeom prst="rect">
             <a:avLst/>
           </a:prstGeom>
           <a:noFill/>
         </p:spPr>
-      </p:pic>
+        <p:txBody>
+          <a:bodyPr wrap="square" rtlCol="0">
+            <a:spAutoFit/>
+          </a:bodyPr>
+          <a:lstStyle/>
+          <a:p>
+            <a:pPr algn="ctr"/>
+            <a:r>
+              <a:rPr lang="pt-BR"/>
+              <a:t>CÓDIGO FONTE:</a:t>
+            </a:r>
+          </a:p>
+          <a:p>
+            <a:pPr algn="ctr"/>
+            <a:r>
+              <a:rPr lang="pt-BR"/>
+              <a:t>SERVIDOR</a:t>
+            </a:r>
+          </a:p>
+          <a:p>
+            <a:pPr algn="ctr"/>
+            <a:endParaRPr lang="pt-BR"/>
+          </a:p>
+          <a:p>
+            <a:pPr algn="ctr"/>
+            <a:r>
+              <a:rPr lang="pt-BR"/>
+              <a:t>ENVIO DA LISTA DE ALUNOS EM FORMATO JSON PARA CLIENTES CONECTADOS</a:t>
+            </a:r>
+            <a:endParaRPr lang="pt-BR" dirty="0"/>
+          </a:p>
+        </p:txBody>
+      </p:sp>
       <p:pic>
         <p:nvPicPr>
-          <p:cNvPr id="2051" name="Picture 3" descr="C:\Users\wgalvao\Downloads\carbon (3).png"/>
+          <p:cNvPr id="16" name="Imagem 15" descr="Texto&#10;&#10;Descrição gerada automaticamente">
+            <a:extLst>
+              <a:ext uri="{FF2B5EF4-FFF2-40B4-BE49-F238E27FC236}">
+                <a16:creationId xmlns:a16="http://schemas.microsoft.com/office/drawing/2014/main" id="{396E9EEB-31AF-2BE5-E170-AEC817C4B6DA}"/>
+              </a:ext>
+            </a:extLst>
+          </p:cNvPr>
           <p:cNvPicPr>
-            <a:picLocks noChangeAspect="1" noChangeArrowheads="1"/>
+            <a:picLocks noChangeAspect="1"/>
           </p:cNvPicPr>
           <p:nvPr/>
         </p:nvPicPr>
         <p:blipFill>
-          <a:blip r:embed="rId3" cstate="print"/>
-          <a:srcRect/>
+          <a:blip r:embed="rId2">
+            <a:extLst>
+              <a:ext uri="{28A0092B-C50C-407E-A947-70E740481C1C}">
+                <a14:useLocalDpi xmlns:a14="http://schemas.microsoft.com/office/drawing/2010/main" val="0"/>
+              </a:ext>
+            </a:extLst>
+          </a:blip>
           <a:stretch>
             <a:fillRect/>
           </a:stretch>
         </p:blipFill>
-        <p:spPr bwMode="auto">
+        <p:spPr>
           <a:xfrm>
-            <a:off x="161519" y="4662998"/>
-            <a:ext cx="8848343" cy="1944216"/>
+            <a:off x="161764" y="1628800"/>
+            <a:ext cx="8820472" cy="4169051"/>
+          </a:xfrm>
+          <a:prstGeom prst="rect">
+            <a:avLst/>
+          </a:prstGeom>
+        </p:spPr>
+      </p:pic>
+    </p:spTree>
+    <p:extLst>
+      <p:ext uri="{BB962C8B-B14F-4D97-AF65-F5344CB8AC3E}">
+        <p14:creationId xmlns:p14="http://schemas.microsoft.com/office/powerpoint/2010/main" val="3003328585"/>
+      </p:ext>
+    </p:extLst>
+  </p:cSld>
+  <p:clrMapOvr>
+    <a:masterClrMapping/>
+  </p:clrMapOvr>
+</p:sld>
+</file>
+
+<file path=ppt/slides/slide6.xml><?xml version="1.0" encoding="utf-8"?>
+<p:sld xmlns:a="http://schemas.openxmlformats.org/drawingml/2006/main" xmlns:r="http://schemas.openxmlformats.org/officeDocument/2006/relationships" xmlns:p="http://schemas.openxmlformats.org/presentationml/2006/main">
+  <p:cSld>
+    <p:spTree>
+      <p:nvGrpSpPr>
+        <p:cNvPr id="1" name=""/>
+        <p:cNvGrpSpPr/>
+        <p:nvPr/>
+      </p:nvGrpSpPr>
+      <p:grpSpPr>
+        <a:xfrm>
+          <a:off x="0" y="0"/>
+          <a:ext cx="0" cy="0"/>
+          <a:chOff x="0" y="0"/>
+          <a:chExt cx="0" cy="0"/>
+        </a:xfrm>
+      </p:grpSpPr>
+      <p:sp>
+        <p:nvSpPr>
+          <p:cNvPr id="4" name="CaixaDeTexto 3"/>
+          <p:cNvSpPr txBox="1"/>
+          <p:nvPr/>
+        </p:nvSpPr>
+        <p:spPr>
+          <a:xfrm>
+            <a:off x="395536" y="44624"/>
+            <a:ext cx="8352928" cy="369332"/>
           </a:xfrm>
           <a:prstGeom prst="rect">
             <a:avLst/>
           </a:prstGeom>
           <a:noFill/>
         </p:spPr>
+        <p:txBody>
+          <a:bodyPr wrap="square" rtlCol="0">
+            <a:spAutoFit/>
+          </a:bodyPr>
+          <a:lstStyle/>
+          <a:p>
+            <a:pPr algn="ctr"/>
+            <a:r>
+              <a:rPr lang="pt-BR" dirty="0"/>
+              <a:t>PROCESSAMENTO DE MENSAGENS DE CLIENTES WEBSOCKET</a:t>
+            </a:r>
+          </a:p>
+        </p:txBody>
+      </p:sp>
+      <p:pic>
+        <p:nvPicPr>
+          <p:cNvPr id="5" name="Imagem 4" descr="Texto&#10;&#10;Descrição gerada automaticamente">
+            <a:extLst>
+              <a:ext uri="{FF2B5EF4-FFF2-40B4-BE49-F238E27FC236}">
+                <a16:creationId xmlns:a16="http://schemas.microsoft.com/office/drawing/2014/main" id="{64BC7AD7-6B93-BE60-F84B-35B4EBD39FDD}"/>
+              </a:ext>
+            </a:extLst>
+          </p:cNvPr>
+          <p:cNvPicPr>
+            <a:picLocks noChangeAspect="1"/>
+          </p:cNvPicPr>
+          <p:nvPr/>
+        </p:nvPicPr>
+        <p:blipFill>
+          <a:blip r:embed="rId2">
+            <a:extLst>
+              <a:ext uri="{28A0092B-C50C-407E-A947-70E740481C1C}">
+                <a14:useLocalDpi xmlns:a14="http://schemas.microsoft.com/office/drawing/2010/main" val="0"/>
+              </a:ext>
+            </a:extLst>
+          </a:blip>
+          <a:stretch>
+            <a:fillRect/>
+          </a:stretch>
+        </p:blipFill>
+        <p:spPr>
+          <a:xfrm>
+            <a:off x="1727684" y="375123"/>
+            <a:ext cx="5688632" cy="6410821"/>
+          </a:xfrm>
+          <a:prstGeom prst="rect">
+            <a:avLst/>
+          </a:prstGeom>
+        </p:spPr>
       </p:pic>
     </p:spTree>
+    <p:extLst>
+      <p:ext uri="{BB962C8B-B14F-4D97-AF65-F5344CB8AC3E}">
+        <p14:creationId xmlns:p14="http://schemas.microsoft.com/office/powerpoint/2010/main" val="1499978090"/>
+      </p:ext>
+    </p:extLst>
+  </p:cSld>
+  <p:clrMapOvr>
+    <a:masterClrMapping/>
+  </p:clrMapOvr>
+</p:sld>
+</file>
+
+<file path=ppt/slides/slide7.xml><?xml version="1.0" encoding="utf-8"?>
+<p:sld xmlns:a="http://schemas.openxmlformats.org/drawingml/2006/main" xmlns:r="http://schemas.openxmlformats.org/officeDocument/2006/relationships" xmlns:p="http://schemas.openxmlformats.org/presentationml/2006/main">
+  <p:cSld>
+    <p:spTree>
+      <p:nvGrpSpPr>
+        <p:cNvPr id="1" name=""/>
+        <p:cNvGrpSpPr/>
+        <p:nvPr/>
+      </p:nvGrpSpPr>
+      <p:grpSpPr>
+        <a:xfrm>
+          <a:off x="0" y="0"/>
+          <a:ext cx="0" cy="0"/>
+          <a:chOff x="0" y="0"/>
+          <a:chExt cx="0" cy="0"/>
+        </a:xfrm>
+      </p:grpSpPr>
+      <p:sp>
+        <p:nvSpPr>
+          <p:cNvPr id="4" name="CaixaDeTexto 3"/>
+          <p:cNvSpPr txBox="1"/>
+          <p:nvPr/>
+        </p:nvSpPr>
+        <p:spPr>
+          <a:xfrm>
+            <a:off x="395536" y="260648"/>
+            <a:ext cx="8352928" cy="1200329"/>
+          </a:xfrm>
+          <a:prstGeom prst="rect">
+            <a:avLst/>
+          </a:prstGeom>
+          <a:noFill/>
+        </p:spPr>
+        <p:txBody>
+          <a:bodyPr wrap="square" rtlCol="0">
+            <a:spAutoFit/>
+          </a:bodyPr>
+          <a:lstStyle/>
+          <a:p>
+            <a:pPr algn="ctr"/>
+            <a:r>
+              <a:rPr lang="pt-BR" dirty="0"/>
+              <a:t>CÓDIGO FONTE:</a:t>
+            </a:r>
+          </a:p>
+          <a:p>
+            <a:pPr algn="ctr"/>
+            <a:r>
+              <a:rPr lang="pt-BR" dirty="0"/>
+              <a:t>SERVIDOR</a:t>
+            </a:r>
+          </a:p>
+          <a:p>
+            <a:pPr algn="ctr"/>
+            <a:endParaRPr lang="pt-BR" dirty="0"/>
+          </a:p>
+          <a:p>
+            <a:pPr algn="ctr"/>
+            <a:r>
+              <a:rPr lang="pt-BR" dirty="0"/>
+              <a:t>DEFINIÇÃO DA CLASSE ALUNO E INICIALIZAÇÃO DE CONJUNTOS</a:t>
+            </a:r>
+          </a:p>
+        </p:txBody>
+      </p:sp>
+      <p:pic>
+        <p:nvPicPr>
+          <p:cNvPr id="3" name="Imagem 2" descr="Tela de computador com letras e números em fundo preto&#10;&#10;Descrição gerada automaticamente">
+            <a:extLst>
+              <a:ext uri="{FF2B5EF4-FFF2-40B4-BE49-F238E27FC236}">
+                <a16:creationId xmlns:a16="http://schemas.microsoft.com/office/drawing/2014/main" id="{B6B29EE3-EB30-B25C-3D1C-75C0A12698A9}"/>
+              </a:ext>
+            </a:extLst>
+          </p:cNvPr>
+          <p:cNvPicPr>
+            <a:picLocks noChangeAspect="1"/>
+          </p:cNvPicPr>
+          <p:nvPr/>
+        </p:nvPicPr>
+        <p:blipFill>
+          <a:blip r:embed="rId2">
+            <a:extLst>
+              <a:ext uri="{28A0092B-C50C-407E-A947-70E740481C1C}">
+                <a14:useLocalDpi xmlns:a14="http://schemas.microsoft.com/office/drawing/2010/main" val="0"/>
+              </a:ext>
+            </a:extLst>
+          </a:blip>
+          <a:stretch>
+            <a:fillRect/>
+          </a:stretch>
+        </p:blipFill>
+        <p:spPr>
+          <a:xfrm>
+            <a:off x="233772" y="2204864"/>
+            <a:ext cx="8676456" cy="2715392"/>
+          </a:xfrm>
+          <a:prstGeom prst="rect">
+            <a:avLst/>
+          </a:prstGeom>
+        </p:spPr>
+      </p:pic>
+    </p:spTree>
+  </p:cSld>
+  <p:clrMapOvr>
+    <a:masterClrMapping/>
+  </p:clrMapOvr>
+</p:sld>
+</file>
+
+<file path=ppt/slides/slide8.xml><?xml version="1.0" encoding="utf-8"?>
+<p:sld xmlns:a="http://schemas.openxmlformats.org/drawingml/2006/main" xmlns:r="http://schemas.openxmlformats.org/officeDocument/2006/relationships" xmlns:p="http://schemas.openxmlformats.org/presentationml/2006/main">
+  <p:cSld>
+    <p:spTree>
+      <p:nvGrpSpPr>
+        <p:cNvPr id="1" name=""/>
+        <p:cNvGrpSpPr/>
+        <p:nvPr/>
+      </p:nvGrpSpPr>
+      <p:grpSpPr>
+        <a:xfrm>
+          <a:off x="0" y="0"/>
+          <a:ext cx="0" cy="0"/>
+          <a:chOff x="0" y="0"/>
+          <a:chExt cx="0" cy="0"/>
+        </a:xfrm>
+      </p:grpSpPr>
+      <p:sp>
+        <p:nvSpPr>
+          <p:cNvPr id="4" name="CaixaDeTexto 3"/>
+          <p:cNvSpPr txBox="1"/>
+          <p:nvPr/>
+        </p:nvSpPr>
+        <p:spPr>
+          <a:xfrm>
+            <a:off x="395536" y="260648"/>
+            <a:ext cx="8352928" cy="1200329"/>
+          </a:xfrm>
+          <a:prstGeom prst="rect">
+            <a:avLst/>
+          </a:prstGeom>
+          <a:noFill/>
+        </p:spPr>
+        <p:txBody>
+          <a:bodyPr wrap="square" rtlCol="0">
+            <a:spAutoFit/>
+          </a:bodyPr>
+          <a:lstStyle/>
+          <a:p>
+            <a:pPr algn="ctr"/>
+            <a:r>
+              <a:rPr lang="pt-BR"/>
+              <a:t>CÓDIGO FONTE:</a:t>
+            </a:r>
+          </a:p>
+          <a:p>
+            <a:pPr algn="ctr"/>
+            <a:r>
+              <a:rPr lang="pt-BR"/>
+              <a:t>SERVIDOR</a:t>
+            </a:r>
+          </a:p>
+          <a:p>
+            <a:pPr algn="ctr"/>
+            <a:endParaRPr lang="pt-BR"/>
+          </a:p>
+          <a:p>
+            <a:pPr algn="ctr"/>
+            <a:r>
+              <a:rPr lang="pt-BR"/>
+              <a:t>GERAÇÃO E ENVIO DE RELATÓRIO PDF AOS CLIENTES</a:t>
+            </a:r>
+            <a:endParaRPr lang="pt-BR" dirty="0"/>
+          </a:p>
+        </p:txBody>
+      </p:sp>
+      <p:pic>
+        <p:nvPicPr>
+          <p:cNvPr id="13" name="Imagem 12" descr="Texto&#10;&#10;Descrição gerada automaticamente">
+            <a:extLst>
+              <a:ext uri="{FF2B5EF4-FFF2-40B4-BE49-F238E27FC236}">
+                <a16:creationId xmlns:a16="http://schemas.microsoft.com/office/drawing/2014/main" id="{05343547-47E3-01FE-2F73-B8F3376447A9}"/>
+              </a:ext>
+            </a:extLst>
+          </p:cNvPr>
+          <p:cNvPicPr>
+            <a:picLocks noChangeAspect="1"/>
+          </p:cNvPicPr>
+          <p:nvPr/>
+        </p:nvPicPr>
+        <p:blipFill>
+          <a:blip r:embed="rId2">
+            <a:extLst>
+              <a:ext uri="{28A0092B-C50C-407E-A947-70E740481C1C}">
+                <a14:useLocalDpi xmlns:a14="http://schemas.microsoft.com/office/drawing/2010/main" val="0"/>
+              </a:ext>
+            </a:extLst>
+          </a:blip>
+          <a:stretch>
+            <a:fillRect/>
+          </a:stretch>
+        </p:blipFill>
+        <p:spPr>
+          <a:xfrm>
+            <a:off x="179251" y="1460977"/>
+            <a:ext cx="8785497" cy="5104854"/>
+          </a:xfrm>
+          <a:prstGeom prst="rect">
+            <a:avLst/>
+          </a:prstGeom>
+        </p:spPr>
+      </p:pic>
+    </p:spTree>
+    <p:extLst>
+      <p:ext uri="{BB962C8B-B14F-4D97-AF65-F5344CB8AC3E}">
+        <p14:creationId xmlns:p14="http://schemas.microsoft.com/office/powerpoint/2010/main" val="813212929"/>
+      </p:ext>
+    </p:extLst>
+  </p:cSld>
+  <p:clrMapOvr>
+    <a:masterClrMapping/>
+  </p:clrMapOvr>
+</p:sld>
+</file>
+
+<file path=ppt/slides/slide9.xml><?xml version="1.0" encoding="utf-8"?>
+<p:sld xmlns:a="http://schemas.openxmlformats.org/drawingml/2006/main" xmlns:r="http://schemas.openxmlformats.org/officeDocument/2006/relationships" xmlns:p="http://schemas.openxmlformats.org/presentationml/2006/main">
+  <p:cSld>
+    <p:spTree>
+      <p:nvGrpSpPr>
+        <p:cNvPr id="1" name=""/>
+        <p:cNvGrpSpPr/>
+        <p:nvPr/>
+      </p:nvGrpSpPr>
+      <p:grpSpPr>
+        <a:xfrm>
+          <a:off x="0" y="0"/>
+          <a:ext cx="0" cy="0"/>
+          <a:chOff x="0" y="0"/>
+          <a:chExt cx="0" cy="0"/>
+        </a:xfrm>
+      </p:grpSpPr>
+      <p:sp>
+        <p:nvSpPr>
+          <p:cNvPr id="4" name="CaixaDeTexto 3"/>
+          <p:cNvSpPr txBox="1"/>
+          <p:nvPr/>
+        </p:nvSpPr>
+        <p:spPr>
+          <a:xfrm>
+            <a:off x="179512" y="3244334"/>
+            <a:ext cx="8352928" cy="369332"/>
+          </a:xfrm>
+          <a:prstGeom prst="rect">
+            <a:avLst/>
+          </a:prstGeom>
+          <a:noFill/>
+        </p:spPr>
+        <p:txBody>
+          <a:bodyPr wrap="square" rtlCol="0">
+            <a:spAutoFit/>
+          </a:bodyPr>
+          <a:lstStyle/>
+          <a:p>
+            <a:pPr algn="ctr"/>
+            <a:r>
+              <a:rPr lang="pt-BR" dirty="0"/>
+              <a:t>CÓDIGO FONTE DO CLIENTE</a:t>
+            </a:r>
+          </a:p>
+        </p:txBody>
+      </p:sp>
+    </p:spTree>
+    <p:extLst>
+      <p:ext uri="{BB962C8B-B14F-4D97-AF65-F5344CB8AC3E}">
+        <p14:creationId xmlns:p14="http://schemas.microsoft.com/office/powerpoint/2010/main" val="2486663059"/>
+      </p:ext>
+    </p:extLst>
   </p:cSld>
   <p:clrMapOvr>
     <a:masterClrMapping/>

</xml_diff>